<commit_message>
fix mapping.pdf and mapping.pptx
</commit_message>
<xml_diff>
--- a/mapping.pptx
+++ b/mapping.pptx
@@ -254,7 +254,7 @@
           <a:p>
             <a:fld id="{730E937F-CA40-4427-8BD6-CB5A6C86C2DF}" type="datetimeFigureOut">
               <a:rPr lang="fr-FR" smtClean="0"/>
-              <a:t>13/04/2019</a:t>
+              <a:t>14/04/2019</a:t>
             </a:fld>
             <a:endParaRPr lang="fr-FR"/>
           </a:p>
@@ -454,7 +454,7 @@
           <a:p>
             <a:fld id="{730E937F-CA40-4427-8BD6-CB5A6C86C2DF}" type="datetimeFigureOut">
               <a:rPr lang="fr-FR" smtClean="0"/>
-              <a:t>13/04/2019</a:t>
+              <a:t>14/04/2019</a:t>
             </a:fld>
             <a:endParaRPr lang="fr-FR"/>
           </a:p>
@@ -634,7 +634,7 @@
           <a:p>
             <a:fld id="{730E937F-CA40-4427-8BD6-CB5A6C86C2DF}" type="datetimeFigureOut">
               <a:rPr lang="fr-FR" smtClean="0"/>
-              <a:t>13/04/2019</a:t>
+              <a:t>14/04/2019</a:t>
             </a:fld>
             <a:endParaRPr lang="fr-FR"/>
           </a:p>
@@ -804,7 +804,7 @@
           <a:p>
             <a:fld id="{730E937F-CA40-4427-8BD6-CB5A6C86C2DF}" type="datetimeFigureOut">
               <a:rPr lang="fr-FR" smtClean="0"/>
-              <a:t>13/04/2019</a:t>
+              <a:t>14/04/2019</a:t>
             </a:fld>
             <a:endParaRPr lang="fr-FR"/>
           </a:p>
@@ -1080,7 +1080,7 @@
           <a:p>
             <a:fld id="{730E937F-CA40-4427-8BD6-CB5A6C86C2DF}" type="datetimeFigureOut">
               <a:rPr lang="fr-FR" smtClean="0"/>
-              <a:t>13/04/2019</a:t>
+              <a:t>14/04/2019</a:t>
             </a:fld>
             <a:endParaRPr lang="fr-FR"/>
           </a:p>
@@ -1312,7 +1312,7 @@
           <a:p>
             <a:fld id="{730E937F-CA40-4427-8BD6-CB5A6C86C2DF}" type="datetimeFigureOut">
               <a:rPr lang="fr-FR" smtClean="0"/>
-              <a:t>13/04/2019</a:t>
+              <a:t>14/04/2019</a:t>
             </a:fld>
             <a:endParaRPr lang="fr-FR"/>
           </a:p>
@@ -1679,7 +1679,7 @@
           <a:p>
             <a:fld id="{730E937F-CA40-4427-8BD6-CB5A6C86C2DF}" type="datetimeFigureOut">
               <a:rPr lang="fr-FR" smtClean="0"/>
-              <a:t>13/04/2019</a:t>
+              <a:t>14/04/2019</a:t>
             </a:fld>
             <a:endParaRPr lang="fr-FR"/>
           </a:p>
@@ -1797,7 +1797,7 @@
           <a:p>
             <a:fld id="{730E937F-CA40-4427-8BD6-CB5A6C86C2DF}" type="datetimeFigureOut">
               <a:rPr lang="fr-FR" smtClean="0"/>
-              <a:t>13/04/2019</a:t>
+              <a:t>14/04/2019</a:t>
             </a:fld>
             <a:endParaRPr lang="fr-FR"/>
           </a:p>
@@ -1892,7 +1892,7 @@
           <a:p>
             <a:fld id="{730E937F-CA40-4427-8BD6-CB5A6C86C2DF}" type="datetimeFigureOut">
               <a:rPr lang="fr-FR" smtClean="0"/>
-              <a:t>13/04/2019</a:t>
+              <a:t>14/04/2019</a:t>
             </a:fld>
             <a:endParaRPr lang="fr-FR"/>
           </a:p>
@@ -2169,7 +2169,7 @@
           <a:p>
             <a:fld id="{730E937F-CA40-4427-8BD6-CB5A6C86C2DF}" type="datetimeFigureOut">
               <a:rPr lang="fr-FR" smtClean="0"/>
-              <a:t>13/04/2019</a:t>
+              <a:t>14/04/2019</a:t>
             </a:fld>
             <a:endParaRPr lang="fr-FR"/>
           </a:p>
@@ -2422,7 +2422,7 @@
           <a:p>
             <a:fld id="{730E937F-CA40-4427-8BD6-CB5A6C86C2DF}" type="datetimeFigureOut">
               <a:rPr lang="fr-FR" smtClean="0"/>
-              <a:t>13/04/2019</a:t>
+              <a:t>14/04/2019</a:t>
             </a:fld>
             <a:endParaRPr lang="fr-FR"/>
           </a:p>
@@ -2635,7 +2635,7 @@
           <a:p>
             <a:fld id="{730E937F-CA40-4427-8BD6-CB5A6C86C2DF}" type="datetimeFigureOut">
               <a:rPr lang="fr-FR" smtClean="0"/>
-              <a:t>13/04/2019</a:t>
+              <a:t>14/04/2019</a:t>
             </a:fld>
             <a:endParaRPr lang="fr-FR"/>
           </a:p>
@@ -7250,15 +7250,7 @@
                   <a:schemeClr val="tx1"/>
                 </a:solidFill>
               </a:rPr>
-              <a:t> </a:t>
-            </a:r>
-            <a:r>
-              <a:rPr lang="fr-FR" sz="500" b="1" dirty="0" smtClean="0">
-                <a:solidFill>
-                  <a:schemeClr val="tx1"/>
-                </a:solidFill>
-              </a:rPr>
-              <a:t>ON/OFF</a:t>
+              <a:t> ON/OFF</a:t>
             </a:r>
             <a:endParaRPr lang="fr-FR" sz="500" b="1" dirty="0">
               <a:solidFill>
@@ -8606,7 +8598,7 @@
           <a:p>
             <a:pPr algn="ctr"/>
             <a:r>
-              <a:rPr lang="fr-FR" sz="1000" b="1" dirty="0" smtClean="0">
+              <a:rPr lang="fr-FR" sz="1000" b="1" smtClean="0">
                 <a:ln w="0"/>
                 <a:solidFill>
                   <a:schemeClr val="accent1"/>
@@ -8619,8 +8611,37 @@
                   </a:outerShdw>
                 </a:effectLst>
               </a:rPr>
-              <a:t>Version 0.5</a:t>
-            </a:r>
+              <a:t>Version </a:t>
+            </a:r>
+            <a:r>
+              <a:rPr lang="fr-FR" sz="1000" b="1" smtClean="0">
+                <a:ln w="0"/>
+                <a:solidFill>
+                  <a:schemeClr val="accent1"/>
+                </a:solidFill>
+                <a:effectLst>
+                  <a:outerShdw blurRad="38100" dist="25400" dir="5400000" algn="ctr" rotWithShape="0">
+                    <a:srgbClr val="6E747A">
+                      <a:alpha val="43000"/>
+                    </a:srgbClr>
+                  </a:outerShdw>
+                </a:effectLst>
+              </a:rPr>
+              <a:t>0.5.0</a:t>
+            </a:r>
+            <a:endParaRPr lang="fr-FR" sz="1000" b="1" dirty="0" smtClean="0">
+              <a:ln w="0"/>
+              <a:solidFill>
+                <a:schemeClr val="accent1"/>
+              </a:solidFill>
+              <a:effectLst>
+                <a:outerShdw blurRad="38100" dist="25400" dir="5400000" algn="ctr" rotWithShape="0">
+                  <a:srgbClr val="6E747A">
+                    <a:alpha val="43000"/>
+                  </a:srgbClr>
+                </a:outerShdw>
+              </a:effectLst>
+            </a:endParaRPr>
           </a:p>
         </p:txBody>
       </p:sp>

</xml_diff>

<commit_message>
fixes and add VSL functions
</commit_message>
<xml_diff>
--- a/mapping.pptx
+++ b/mapping.pptx
@@ -254,7 +254,7 @@
           <a:p>
             <a:fld id="{730E937F-CA40-4427-8BD6-CB5A6C86C2DF}" type="datetimeFigureOut">
               <a:rPr lang="fr-FR" smtClean="0"/>
-              <a:t>14/04/2019</a:t>
+              <a:t>17/04/2019</a:t>
             </a:fld>
             <a:endParaRPr lang="fr-FR"/>
           </a:p>
@@ -454,7 +454,7 @@
           <a:p>
             <a:fld id="{730E937F-CA40-4427-8BD6-CB5A6C86C2DF}" type="datetimeFigureOut">
               <a:rPr lang="fr-FR" smtClean="0"/>
-              <a:t>14/04/2019</a:t>
+              <a:t>17/04/2019</a:t>
             </a:fld>
             <a:endParaRPr lang="fr-FR"/>
           </a:p>
@@ -634,7 +634,7 @@
           <a:p>
             <a:fld id="{730E937F-CA40-4427-8BD6-CB5A6C86C2DF}" type="datetimeFigureOut">
               <a:rPr lang="fr-FR" smtClean="0"/>
-              <a:t>14/04/2019</a:t>
+              <a:t>17/04/2019</a:t>
             </a:fld>
             <a:endParaRPr lang="fr-FR"/>
           </a:p>
@@ -804,7 +804,7 @@
           <a:p>
             <a:fld id="{730E937F-CA40-4427-8BD6-CB5A6C86C2DF}" type="datetimeFigureOut">
               <a:rPr lang="fr-FR" smtClean="0"/>
-              <a:t>14/04/2019</a:t>
+              <a:t>17/04/2019</a:t>
             </a:fld>
             <a:endParaRPr lang="fr-FR"/>
           </a:p>
@@ -1080,7 +1080,7 @@
           <a:p>
             <a:fld id="{730E937F-CA40-4427-8BD6-CB5A6C86C2DF}" type="datetimeFigureOut">
               <a:rPr lang="fr-FR" smtClean="0"/>
-              <a:t>14/04/2019</a:t>
+              <a:t>17/04/2019</a:t>
             </a:fld>
             <a:endParaRPr lang="fr-FR"/>
           </a:p>
@@ -1312,7 +1312,7 @@
           <a:p>
             <a:fld id="{730E937F-CA40-4427-8BD6-CB5A6C86C2DF}" type="datetimeFigureOut">
               <a:rPr lang="fr-FR" smtClean="0"/>
-              <a:t>14/04/2019</a:t>
+              <a:t>17/04/2019</a:t>
             </a:fld>
             <a:endParaRPr lang="fr-FR"/>
           </a:p>
@@ -1679,7 +1679,7 @@
           <a:p>
             <a:fld id="{730E937F-CA40-4427-8BD6-CB5A6C86C2DF}" type="datetimeFigureOut">
               <a:rPr lang="fr-FR" smtClean="0"/>
-              <a:t>14/04/2019</a:t>
+              <a:t>17/04/2019</a:t>
             </a:fld>
             <a:endParaRPr lang="fr-FR"/>
           </a:p>
@@ -1797,7 +1797,7 @@
           <a:p>
             <a:fld id="{730E937F-CA40-4427-8BD6-CB5A6C86C2DF}" type="datetimeFigureOut">
               <a:rPr lang="fr-FR" smtClean="0"/>
-              <a:t>14/04/2019</a:t>
+              <a:t>17/04/2019</a:t>
             </a:fld>
             <a:endParaRPr lang="fr-FR"/>
           </a:p>
@@ -1892,7 +1892,7 @@
           <a:p>
             <a:fld id="{730E937F-CA40-4427-8BD6-CB5A6C86C2DF}" type="datetimeFigureOut">
               <a:rPr lang="fr-FR" smtClean="0"/>
-              <a:t>14/04/2019</a:t>
+              <a:t>17/04/2019</a:t>
             </a:fld>
             <a:endParaRPr lang="fr-FR"/>
           </a:p>
@@ -2169,7 +2169,7 @@
           <a:p>
             <a:fld id="{730E937F-CA40-4427-8BD6-CB5A6C86C2DF}" type="datetimeFigureOut">
               <a:rPr lang="fr-FR" smtClean="0"/>
-              <a:t>14/04/2019</a:t>
+              <a:t>17/04/2019</a:t>
             </a:fld>
             <a:endParaRPr lang="fr-FR"/>
           </a:p>
@@ -2422,7 +2422,7 @@
           <a:p>
             <a:fld id="{730E937F-CA40-4427-8BD6-CB5A6C86C2DF}" type="datetimeFigureOut">
               <a:rPr lang="fr-FR" smtClean="0"/>
-              <a:t>14/04/2019</a:t>
+              <a:t>17/04/2019</a:t>
             </a:fld>
             <a:endParaRPr lang="fr-FR"/>
           </a:p>
@@ -2635,7 +2635,7 @@
           <a:p>
             <a:fld id="{730E937F-CA40-4427-8BD6-CB5A6C86C2DF}" type="datetimeFigureOut">
               <a:rPr lang="fr-FR" smtClean="0"/>
-              <a:t>14/04/2019</a:t>
+              <a:t>17/04/2019</a:t>
             </a:fld>
             <a:endParaRPr lang="fr-FR"/>
           </a:p>
@@ -6000,14 +6000,14 @@
       </p:sp>
       <p:sp>
         <p:nvSpPr>
-          <p:cNvPr id="53" name="Rectangle à coins arrondis 52"/>
+          <p:cNvPr id="55" name="Rectangle à coins arrondis 54"/>
           <p:cNvSpPr/>
           <p:nvPr/>
         </p:nvSpPr>
         <p:spPr>
           <a:xfrm>
-            <a:off x="1001737" y="5783713"/>
-            <a:ext cx="492063" cy="119528"/>
+            <a:off x="1001737" y="6073866"/>
+            <a:ext cx="492063" cy="111594"/>
           </a:xfrm>
           <a:prstGeom prst="roundRect">
             <a:avLst/>
@@ -6064,7 +6064,7 @@
                   <a:schemeClr val="tx1"/>
                 </a:solidFill>
               </a:rPr>
-              <a:t>LTN NAV/AA mode</a:t>
+              <a:t>LTN A/G mode</a:t>
             </a:r>
             <a:endParaRPr lang="fr-FR" sz="400" b="1" dirty="0">
               <a:solidFill>
@@ -6076,14 +6076,14 @@
       </p:sp>
       <p:sp>
         <p:nvSpPr>
-          <p:cNvPr id="55" name="Rectangle à coins arrondis 54"/>
+          <p:cNvPr id="60" name="Rectangle à coins arrondis 59"/>
           <p:cNvSpPr/>
           <p:nvPr/>
         </p:nvSpPr>
         <p:spPr>
           <a:xfrm>
-            <a:off x="1001737" y="6073866"/>
-            <a:ext cx="492063" cy="111594"/>
+            <a:off x="1001048" y="6274977"/>
+            <a:ext cx="492063" cy="102045"/>
           </a:xfrm>
           <a:prstGeom prst="roundRect">
             <a:avLst/>
@@ -6140,7 +6140,31 @@
                   <a:schemeClr val="tx1"/>
                 </a:solidFill>
               </a:rPr>
-              <a:t>LTN A/G mode</a:t>
+              <a:t>LTN FOV </a:t>
+            </a:r>
+            <a:r>
+              <a:rPr lang="fr-FR" sz="400" b="1" dirty="0" err="1" smtClean="0">
+                <a:solidFill>
+                  <a:schemeClr val="tx1"/>
+                </a:solidFill>
+              </a:rPr>
+              <a:t>Toggle</a:t>
+            </a:r>
+            <a:endParaRPr lang="fr-FR" sz="400" b="1" dirty="0" smtClean="0">
+              <a:solidFill>
+                <a:schemeClr val="tx1"/>
+              </a:solidFill>
+            </a:endParaRPr>
+          </a:p>
+          <a:p>
+            <a:pPr algn="ctr"/>
+            <a:r>
+              <a:rPr lang="fr-FR" sz="400" b="1" dirty="0" smtClean="0">
+                <a:solidFill>
+                  <a:srgbClr val="FF0000"/>
+                </a:solidFill>
+              </a:rPr>
+              <a:t>Switch TCS/FLIR</a:t>
             </a:r>
             <a:endParaRPr lang="fr-FR" sz="400" b="1" dirty="0">
               <a:solidFill>
@@ -6152,14 +6176,14 @@
       </p:sp>
       <p:sp>
         <p:nvSpPr>
-          <p:cNvPr id="60" name="Rectangle à coins arrondis 59"/>
+          <p:cNvPr id="61" name="Rectangle à coins arrondis 60"/>
           <p:cNvSpPr/>
           <p:nvPr/>
         </p:nvSpPr>
         <p:spPr>
           <a:xfrm>
-            <a:off x="1513810" y="6274977"/>
-            <a:ext cx="492063" cy="102045"/>
+            <a:off x="1001048" y="6417017"/>
+            <a:ext cx="492063" cy="94610"/>
           </a:xfrm>
           <a:prstGeom prst="roundRect">
             <a:avLst/>
@@ -6216,31 +6240,7 @@
                   <a:schemeClr val="tx1"/>
                 </a:solidFill>
               </a:rPr>
-              <a:t>LTN FOV </a:t>
-            </a:r>
-            <a:r>
-              <a:rPr lang="fr-FR" sz="400" b="1" dirty="0" err="1" smtClean="0">
-                <a:solidFill>
-                  <a:schemeClr val="tx1"/>
-                </a:solidFill>
-              </a:rPr>
-              <a:t>Toggle</a:t>
-            </a:r>
-            <a:endParaRPr lang="fr-FR" sz="400" b="1" dirty="0" smtClean="0">
-              <a:solidFill>
-                <a:schemeClr val="tx1"/>
-              </a:solidFill>
-            </a:endParaRPr>
-          </a:p>
-          <a:p>
-            <a:pPr algn="ctr"/>
-            <a:r>
-              <a:rPr lang="fr-FR" sz="400" b="1" dirty="0" smtClean="0">
-                <a:solidFill>
-                  <a:srgbClr val="FF0000"/>
-                </a:solidFill>
-              </a:rPr>
-              <a:t>Switch TCS/FLIR</a:t>
+              <a:t>LTN Laser Focus</a:t>
             </a:r>
             <a:endParaRPr lang="fr-FR" sz="400" b="1" dirty="0">
               <a:solidFill>
@@ -6252,14 +6252,823 @@
       </p:sp>
       <p:sp>
         <p:nvSpPr>
-          <p:cNvPr id="61" name="Rectangle à coins arrondis 60"/>
+          <p:cNvPr id="62" name="Rectangle à coins arrondis 61"/>
           <p:cNvSpPr/>
           <p:nvPr/>
         </p:nvSpPr>
         <p:spPr>
           <a:xfrm>
-            <a:off x="1513810" y="6417017"/>
-            <a:ext cx="492063" cy="94610"/>
+            <a:off x="30529" y="6269831"/>
+            <a:ext cx="331726" cy="107191"/>
+          </a:xfrm>
+          <a:prstGeom prst="roundRect">
+            <a:avLst/>
+          </a:prstGeom>
+          <a:ln/>
+        </p:spPr>
+        <p:style>
+          <a:lnRef idx="2">
+            <a:schemeClr val="dk1"/>
+          </a:lnRef>
+          <a:fillRef idx="1">
+            <a:schemeClr val="lt1"/>
+          </a:fillRef>
+          <a:effectRef idx="0">
+            <a:schemeClr val="dk1"/>
+          </a:effectRef>
+          <a:fontRef idx="minor">
+            <a:schemeClr val="dk1"/>
+          </a:fontRef>
+        </p:style>
+        <p:txBody>
+          <a:bodyPr lIns="0" tIns="0" rIns="0" bIns="0" rtlCol="0" anchor="ctr"/>
+          <a:lstStyle/>
+          <a:p>
+            <a:pPr algn="ctr"/>
+            <a:r>
+              <a:rPr lang="fr-FR" sz="500" b="1" dirty="0" err="1" smtClean="0">
+                <a:solidFill>
+                  <a:schemeClr val="tx1"/>
+                </a:solidFill>
+              </a:rPr>
+              <a:t>forward</a:t>
+            </a:r>
+            <a:endParaRPr lang="fr-FR" sz="500" b="1" dirty="0">
+              <a:solidFill>
+                <a:srgbClr val="FF0000"/>
+              </a:solidFill>
+            </a:endParaRPr>
+          </a:p>
+        </p:txBody>
+      </p:sp>
+      <p:sp>
+        <p:nvSpPr>
+          <p:cNvPr id="64" name="Rectangle à coins arrondis 63"/>
+          <p:cNvSpPr/>
+          <p:nvPr/>
+        </p:nvSpPr>
+        <p:spPr>
+          <a:xfrm>
+            <a:off x="30529" y="6424470"/>
+            <a:ext cx="331726" cy="96581"/>
+          </a:xfrm>
+          <a:prstGeom prst="roundRect">
+            <a:avLst/>
+          </a:prstGeom>
+          <a:ln/>
+        </p:spPr>
+        <p:style>
+          <a:lnRef idx="2">
+            <a:schemeClr val="dk1"/>
+          </a:lnRef>
+          <a:fillRef idx="1">
+            <a:schemeClr val="lt1"/>
+          </a:fillRef>
+          <a:effectRef idx="0">
+            <a:schemeClr val="dk1"/>
+          </a:effectRef>
+          <a:fontRef idx="minor">
+            <a:schemeClr val="dk1"/>
+          </a:fontRef>
+        </p:style>
+        <p:txBody>
+          <a:bodyPr lIns="0" tIns="0" rIns="0" bIns="0" rtlCol="0" anchor="ctr"/>
+          <a:lstStyle/>
+          <a:p>
+            <a:pPr algn="ctr"/>
+            <a:r>
+              <a:rPr lang="fr-FR" sz="500" b="1" dirty="0" smtClean="0">
+                <a:solidFill>
+                  <a:schemeClr val="tx1"/>
+                </a:solidFill>
+              </a:rPr>
+              <a:t>back</a:t>
+            </a:r>
+            <a:endParaRPr lang="fr-FR" sz="500" b="1" dirty="0">
+              <a:solidFill>
+                <a:schemeClr val="tx1"/>
+              </a:solidFill>
+            </a:endParaRPr>
+          </a:p>
+        </p:txBody>
+      </p:sp>
+      <p:sp>
+        <p:nvSpPr>
+          <p:cNvPr id="65" name="Rectangle à coins arrondis 64"/>
+          <p:cNvSpPr/>
+          <p:nvPr/>
+        </p:nvSpPr>
+        <p:spPr>
+          <a:xfrm>
+            <a:off x="633780" y="5301765"/>
+            <a:ext cx="425161" cy="149450"/>
+          </a:xfrm>
+          <a:prstGeom prst="roundRect">
+            <a:avLst/>
+          </a:prstGeom>
+          <a:noFill/>
+          <a:ln w="9525" cap="flat" cmpd="sng" algn="ctr">
+            <a:solidFill>
+              <a:schemeClr val="accent6"/>
+            </a:solidFill>
+            <a:prstDash val="solid"/>
+            <a:round/>
+            <a:headEnd type="none" w="med" len="med"/>
+            <a:tailEnd type="none" w="med" len="med"/>
+          </a:ln>
+        </p:spPr>
+        <p:style>
+          <a:lnRef idx="0">
+            <a:scrgbClr r="0" g="0" b="0"/>
+          </a:lnRef>
+          <a:fillRef idx="0">
+            <a:scrgbClr r="0" g="0" b="0"/>
+          </a:fillRef>
+          <a:effectRef idx="0">
+            <a:scrgbClr r="0" g="0" b="0"/>
+          </a:effectRef>
+          <a:fontRef idx="minor">
+            <a:schemeClr val="accent6"/>
+          </a:fontRef>
+        </p:style>
+        <p:txBody>
+          <a:bodyPr lIns="0" tIns="0" rIns="0" bIns="0" rtlCol="0" anchor="ctr"/>
+          <a:lstStyle/>
+          <a:p>
+            <a:pPr algn="ctr"/>
+            <a:r>
+              <a:rPr lang="fr-FR" sz="500" b="1" dirty="0" smtClean="0">
+                <a:solidFill>
+                  <a:schemeClr val="tx1"/>
+                </a:solidFill>
+              </a:rPr>
+              <a:t>SRS 2 PTT</a:t>
+            </a:r>
+          </a:p>
+          <a:p>
+            <a:pPr algn="ctr"/>
+            <a:r>
+              <a:rPr lang="fr-FR" sz="500" b="1" dirty="0" smtClean="0">
+                <a:solidFill>
+                  <a:srgbClr val="FF0000"/>
+                </a:solidFill>
+              </a:rPr>
+              <a:t>---</a:t>
+            </a:r>
+          </a:p>
+        </p:txBody>
+      </p:sp>
+      <p:sp>
+        <p:nvSpPr>
+          <p:cNvPr id="66" name="Rectangle à coins arrondis 65"/>
+          <p:cNvSpPr/>
+          <p:nvPr/>
+        </p:nvSpPr>
+        <p:spPr>
+          <a:xfrm>
+            <a:off x="1324490" y="5121811"/>
+            <a:ext cx="425161" cy="156300"/>
+          </a:xfrm>
+          <a:prstGeom prst="roundRect">
+            <a:avLst/>
+          </a:prstGeom>
+          <a:noFill/>
+          <a:ln w="9525" cap="flat" cmpd="sng" algn="ctr">
+            <a:solidFill>
+              <a:schemeClr val="accent6"/>
+            </a:solidFill>
+            <a:prstDash val="solid"/>
+            <a:round/>
+            <a:headEnd type="none" w="med" len="med"/>
+            <a:tailEnd type="none" w="med" len="med"/>
+          </a:ln>
+        </p:spPr>
+        <p:style>
+          <a:lnRef idx="0">
+            <a:scrgbClr r="0" g="0" b="0"/>
+          </a:lnRef>
+          <a:fillRef idx="0">
+            <a:scrgbClr r="0" g="0" b="0"/>
+          </a:fillRef>
+          <a:effectRef idx="0">
+            <a:scrgbClr r="0" g="0" b="0"/>
+          </a:effectRef>
+          <a:fontRef idx="minor">
+            <a:schemeClr val="accent6"/>
+          </a:fontRef>
+        </p:style>
+        <p:txBody>
+          <a:bodyPr lIns="0" tIns="0" rIns="0" bIns="0" rtlCol="0" anchor="ctr"/>
+          <a:lstStyle/>
+          <a:p>
+            <a:pPr algn="ctr"/>
+            <a:r>
+              <a:rPr lang="fr-FR" sz="500" b="1" dirty="0" smtClean="0">
+                <a:solidFill>
+                  <a:schemeClr val="tx1"/>
+                </a:solidFill>
+              </a:rPr>
+              <a:t>ICS PTT</a:t>
+            </a:r>
+            <a:endParaRPr lang="fr-FR" sz="500" b="1" dirty="0" smtClean="0">
+              <a:solidFill>
+                <a:srgbClr val="FF0000"/>
+              </a:solidFill>
+            </a:endParaRPr>
+          </a:p>
+        </p:txBody>
+      </p:sp>
+      <p:sp>
+        <p:nvSpPr>
+          <p:cNvPr id="67" name="Rectangle à coins arrondis 66"/>
+          <p:cNvSpPr/>
+          <p:nvPr/>
+        </p:nvSpPr>
+        <p:spPr>
+          <a:xfrm>
+            <a:off x="587062" y="5125052"/>
+            <a:ext cx="425161" cy="153059"/>
+          </a:xfrm>
+          <a:prstGeom prst="roundRect">
+            <a:avLst/>
+          </a:prstGeom>
+          <a:noFill/>
+          <a:ln w="9525" cap="flat" cmpd="sng" algn="ctr">
+            <a:solidFill>
+              <a:schemeClr val="accent6"/>
+            </a:solidFill>
+            <a:prstDash val="solid"/>
+            <a:round/>
+            <a:headEnd type="none" w="med" len="med"/>
+            <a:tailEnd type="none" w="med" len="med"/>
+          </a:ln>
+        </p:spPr>
+        <p:style>
+          <a:lnRef idx="0">
+            <a:scrgbClr r="0" g="0" b="0"/>
+          </a:lnRef>
+          <a:fillRef idx="0">
+            <a:scrgbClr r="0" g="0" b="0"/>
+          </a:fillRef>
+          <a:effectRef idx="0">
+            <a:scrgbClr r="0" g="0" b="0"/>
+          </a:effectRef>
+          <a:fontRef idx="minor">
+            <a:schemeClr val="accent6"/>
+          </a:fontRef>
+        </p:style>
+        <p:txBody>
+          <a:bodyPr lIns="0" tIns="0" rIns="0" bIns="0" rtlCol="0" anchor="ctr"/>
+          <a:lstStyle/>
+          <a:p>
+            <a:pPr algn="ctr"/>
+            <a:r>
+              <a:rPr lang="fr-FR" sz="500" b="1" dirty="0" smtClean="0">
+                <a:solidFill>
+                  <a:schemeClr val="tx1"/>
+                </a:solidFill>
+              </a:rPr>
+              <a:t>COMM menu</a:t>
+            </a:r>
+          </a:p>
+          <a:p>
+            <a:pPr algn="ctr"/>
+            <a:r>
+              <a:rPr lang="fr-FR" sz="500" b="1" dirty="0" smtClean="0">
+                <a:solidFill>
+                  <a:srgbClr val="FF0000"/>
+                </a:solidFill>
+              </a:rPr>
+              <a:t>---</a:t>
+            </a:r>
+          </a:p>
+        </p:txBody>
+      </p:sp>
+      <p:sp>
+        <p:nvSpPr>
+          <p:cNvPr id="72" name="Rectangle à coins arrondis 71"/>
+          <p:cNvSpPr/>
+          <p:nvPr/>
+        </p:nvSpPr>
+        <p:spPr>
+          <a:xfrm>
+            <a:off x="30530" y="5933802"/>
+            <a:ext cx="331726" cy="107191"/>
+          </a:xfrm>
+          <a:prstGeom prst="roundRect">
+            <a:avLst/>
+          </a:prstGeom>
+          <a:ln/>
+        </p:spPr>
+        <p:style>
+          <a:lnRef idx="2">
+            <a:schemeClr val="dk1"/>
+          </a:lnRef>
+          <a:fillRef idx="1">
+            <a:schemeClr val="lt1"/>
+          </a:fillRef>
+          <a:effectRef idx="0">
+            <a:schemeClr val="dk1"/>
+          </a:effectRef>
+          <a:fontRef idx="minor">
+            <a:schemeClr val="dk1"/>
+          </a:fontRef>
+        </p:style>
+        <p:txBody>
+          <a:bodyPr lIns="0" tIns="0" rIns="0" bIns="0" rtlCol="0" anchor="ctr"/>
+          <a:lstStyle/>
+          <a:p>
+            <a:pPr algn="ctr"/>
+            <a:r>
+              <a:rPr lang="fr-FR" sz="500" b="1" dirty="0" smtClean="0">
+                <a:solidFill>
+                  <a:schemeClr val="tx1"/>
+                </a:solidFill>
+              </a:rPr>
+              <a:t>center</a:t>
+            </a:r>
+            <a:endParaRPr lang="fr-FR" sz="500" b="1" dirty="0">
+              <a:solidFill>
+                <a:srgbClr val="FF0000"/>
+              </a:solidFill>
+            </a:endParaRPr>
+          </a:p>
+        </p:txBody>
+      </p:sp>
+      <p:sp>
+        <p:nvSpPr>
+          <p:cNvPr id="73" name="Rectangle à coins arrondis 72"/>
+          <p:cNvSpPr/>
+          <p:nvPr/>
+        </p:nvSpPr>
+        <p:spPr>
+          <a:xfrm>
+            <a:off x="30530" y="6079017"/>
+            <a:ext cx="331726" cy="96581"/>
+          </a:xfrm>
+          <a:prstGeom prst="roundRect">
+            <a:avLst/>
+          </a:prstGeom>
+          <a:ln/>
+        </p:spPr>
+        <p:style>
+          <a:lnRef idx="2">
+            <a:schemeClr val="dk1"/>
+          </a:lnRef>
+          <a:fillRef idx="1">
+            <a:schemeClr val="lt1"/>
+          </a:fillRef>
+          <a:effectRef idx="0">
+            <a:schemeClr val="dk1"/>
+          </a:effectRef>
+          <a:fontRef idx="minor">
+            <a:schemeClr val="dk1"/>
+          </a:fontRef>
+        </p:style>
+        <p:txBody>
+          <a:bodyPr lIns="0" tIns="0" rIns="0" bIns="0" rtlCol="0" anchor="ctr"/>
+          <a:lstStyle/>
+          <a:p>
+            <a:pPr algn="ctr"/>
+            <a:r>
+              <a:rPr lang="fr-FR" sz="500" b="1" dirty="0" smtClean="0">
+                <a:solidFill>
+                  <a:schemeClr val="tx1"/>
+                </a:solidFill>
+              </a:rPr>
+              <a:t>back</a:t>
+            </a:r>
+            <a:endParaRPr lang="fr-FR" sz="500" b="1" dirty="0">
+              <a:solidFill>
+                <a:schemeClr val="tx1"/>
+              </a:solidFill>
+            </a:endParaRPr>
+          </a:p>
+        </p:txBody>
+      </p:sp>
+      <p:sp>
+        <p:nvSpPr>
+          <p:cNvPr id="74" name="Rectangle à coins arrondis 73"/>
+          <p:cNvSpPr/>
+          <p:nvPr/>
+        </p:nvSpPr>
+        <p:spPr>
+          <a:xfrm>
+            <a:off x="30530" y="5788587"/>
+            <a:ext cx="331726" cy="107191"/>
+          </a:xfrm>
+          <a:prstGeom prst="roundRect">
+            <a:avLst/>
+          </a:prstGeom>
+          <a:ln/>
+        </p:spPr>
+        <p:style>
+          <a:lnRef idx="2">
+            <a:schemeClr val="dk1"/>
+          </a:lnRef>
+          <a:fillRef idx="1">
+            <a:schemeClr val="lt1"/>
+          </a:fillRef>
+          <a:effectRef idx="0">
+            <a:schemeClr val="dk1"/>
+          </a:effectRef>
+          <a:fontRef idx="minor">
+            <a:schemeClr val="dk1"/>
+          </a:fontRef>
+        </p:style>
+        <p:txBody>
+          <a:bodyPr lIns="0" tIns="0" rIns="0" bIns="0" rtlCol="0" anchor="ctr"/>
+          <a:lstStyle/>
+          <a:p>
+            <a:pPr algn="ctr"/>
+            <a:r>
+              <a:rPr lang="fr-FR" sz="500" b="1" dirty="0" err="1" smtClean="0">
+                <a:solidFill>
+                  <a:schemeClr val="tx1"/>
+                </a:solidFill>
+              </a:rPr>
+              <a:t>forward</a:t>
+            </a:r>
+            <a:endParaRPr lang="fr-FR" sz="500" b="1" dirty="0">
+              <a:solidFill>
+                <a:srgbClr val="FF0000"/>
+              </a:solidFill>
+            </a:endParaRPr>
+          </a:p>
+        </p:txBody>
+      </p:sp>
+      <p:sp>
+        <p:nvSpPr>
+          <p:cNvPr id="75" name="Rectangle à coins arrondis 74"/>
+          <p:cNvSpPr/>
+          <p:nvPr/>
+        </p:nvSpPr>
+        <p:spPr>
+          <a:xfrm>
+            <a:off x="23898" y="5495652"/>
+            <a:ext cx="331726" cy="107191"/>
+          </a:xfrm>
+          <a:prstGeom prst="roundRect">
+            <a:avLst/>
+          </a:prstGeom>
+          <a:ln/>
+        </p:spPr>
+        <p:style>
+          <a:lnRef idx="2">
+            <a:schemeClr val="dk1"/>
+          </a:lnRef>
+          <a:fillRef idx="1">
+            <a:schemeClr val="lt1"/>
+          </a:fillRef>
+          <a:effectRef idx="0">
+            <a:schemeClr val="dk1"/>
+          </a:effectRef>
+          <a:fontRef idx="minor">
+            <a:schemeClr val="dk1"/>
+          </a:fontRef>
+        </p:style>
+        <p:txBody>
+          <a:bodyPr lIns="0" tIns="0" rIns="0" bIns="0" rtlCol="0" anchor="ctr"/>
+          <a:lstStyle/>
+          <a:p>
+            <a:pPr algn="ctr"/>
+            <a:r>
+              <a:rPr lang="fr-FR" sz="500" b="1" dirty="0" err="1" smtClean="0">
+                <a:solidFill>
+                  <a:schemeClr val="tx1"/>
+                </a:solidFill>
+              </a:rPr>
+              <a:t>forward</a:t>
+            </a:r>
+            <a:endParaRPr lang="fr-FR" sz="500" b="1" dirty="0">
+              <a:solidFill>
+                <a:srgbClr val="FF0000"/>
+              </a:solidFill>
+            </a:endParaRPr>
+          </a:p>
+        </p:txBody>
+      </p:sp>
+      <p:sp>
+        <p:nvSpPr>
+          <p:cNvPr id="76" name="Rectangle à coins arrondis 75"/>
+          <p:cNvSpPr/>
+          <p:nvPr/>
+        </p:nvSpPr>
+        <p:spPr>
+          <a:xfrm>
+            <a:off x="23898" y="5640867"/>
+            <a:ext cx="331726" cy="96581"/>
+          </a:xfrm>
+          <a:prstGeom prst="roundRect">
+            <a:avLst/>
+          </a:prstGeom>
+          <a:ln/>
+        </p:spPr>
+        <p:style>
+          <a:lnRef idx="2">
+            <a:schemeClr val="dk1"/>
+          </a:lnRef>
+          <a:fillRef idx="1">
+            <a:schemeClr val="lt1"/>
+          </a:fillRef>
+          <a:effectRef idx="0">
+            <a:schemeClr val="dk1"/>
+          </a:effectRef>
+          <a:fontRef idx="minor">
+            <a:schemeClr val="dk1"/>
+          </a:fontRef>
+        </p:style>
+        <p:txBody>
+          <a:bodyPr lIns="0" tIns="0" rIns="0" bIns="0" rtlCol="0" anchor="ctr"/>
+          <a:lstStyle/>
+          <a:p>
+            <a:pPr algn="ctr"/>
+            <a:r>
+              <a:rPr lang="fr-FR" sz="500" b="1" dirty="0" smtClean="0">
+                <a:solidFill>
+                  <a:schemeClr val="tx1"/>
+                </a:solidFill>
+              </a:rPr>
+              <a:t>back</a:t>
+            </a:r>
+            <a:endParaRPr lang="fr-FR" sz="500" b="1" dirty="0">
+              <a:solidFill>
+                <a:schemeClr val="tx1"/>
+              </a:solidFill>
+            </a:endParaRPr>
+          </a:p>
+        </p:txBody>
+      </p:sp>
+      <p:sp>
+        <p:nvSpPr>
+          <p:cNvPr id="77" name="Rectangle à coins arrondis 76"/>
+          <p:cNvSpPr/>
+          <p:nvPr/>
+        </p:nvSpPr>
+        <p:spPr>
+          <a:xfrm>
+            <a:off x="2101875" y="4348536"/>
+            <a:ext cx="536550" cy="105767"/>
+          </a:xfrm>
+          <a:prstGeom prst="roundRect">
+            <a:avLst/>
+          </a:prstGeom>
+          <a:ln/>
+        </p:spPr>
+        <p:style>
+          <a:lnRef idx="2">
+            <a:schemeClr val="accent1"/>
+          </a:lnRef>
+          <a:fillRef idx="1">
+            <a:schemeClr val="lt1"/>
+          </a:fillRef>
+          <a:effectRef idx="0">
+            <a:schemeClr val="accent1"/>
+          </a:effectRef>
+          <a:fontRef idx="minor">
+            <a:schemeClr val="dk1"/>
+          </a:fontRef>
+        </p:style>
+        <p:txBody>
+          <a:bodyPr lIns="0" tIns="0" rIns="0" bIns="0" rtlCol="0" anchor="ctr"/>
+          <a:lstStyle/>
+          <a:p>
+            <a:pPr algn="ctr"/>
+            <a:r>
+              <a:rPr lang="fr-FR" sz="500" b="1" dirty="0" err="1" smtClean="0">
+                <a:solidFill>
+                  <a:schemeClr val="tx1"/>
+                </a:solidFill>
+              </a:rPr>
+              <a:t>Kneebrd</a:t>
+            </a:r>
+            <a:r>
+              <a:rPr lang="fr-FR" sz="500" b="1" dirty="0" smtClean="0">
+                <a:solidFill>
+                  <a:schemeClr val="tx1"/>
+                </a:solidFill>
+              </a:rPr>
+              <a:t> </a:t>
+            </a:r>
+            <a:r>
+              <a:rPr lang="fr-FR" sz="500" b="1" dirty="0" err="1" smtClean="0">
+                <a:solidFill>
+                  <a:schemeClr val="tx1"/>
+                </a:solidFill>
+              </a:rPr>
+              <a:t>prev</a:t>
+            </a:r>
+            <a:r>
+              <a:rPr lang="fr-FR" sz="500" b="1" dirty="0" smtClean="0">
+                <a:solidFill>
+                  <a:schemeClr val="tx1"/>
+                </a:solidFill>
+              </a:rPr>
+              <a:t> page</a:t>
+            </a:r>
+            <a:endParaRPr lang="fr-FR" sz="500" b="1" dirty="0">
+              <a:solidFill>
+                <a:srgbClr val="FF0000"/>
+              </a:solidFill>
+            </a:endParaRPr>
+          </a:p>
+        </p:txBody>
+      </p:sp>
+      <p:sp>
+        <p:nvSpPr>
+          <p:cNvPr id="78" name="Rectangle à coins arrondis 77"/>
+          <p:cNvSpPr/>
+          <p:nvPr/>
+        </p:nvSpPr>
+        <p:spPr>
+          <a:xfrm>
+            <a:off x="2101875" y="4893274"/>
+            <a:ext cx="536550" cy="105767"/>
+          </a:xfrm>
+          <a:prstGeom prst="roundRect">
+            <a:avLst/>
+          </a:prstGeom>
+          <a:ln/>
+        </p:spPr>
+        <p:style>
+          <a:lnRef idx="2">
+            <a:schemeClr val="accent1"/>
+          </a:lnRef>
+          <a:fillRef idx="1">
+            <a:schemeClr val="lt1"/>
+          </a:fillRef>
+          <a:effectRef idx="0">
+            <a:schemeClr val="accent1"/>
+          </a:effectRef>
+          <a:fontRef idx="minor">
+            <a:schemeClr val="dk1"/>
+          </a:fontRef>
+        </p:style>
+        <p:txBody>
+          <a:bodyPr lIns="0" tIns="0" rIns="0" bIns="0" rtlCol="0" anchor="ctr"/>
+          <a:lstStyle/>
+          <a:p>
+            <a:pPr algn="ctr"/>
+            <a:r>
+              <a:rPr lang="fr-FR" sz="500" b="1" dirty="0" err="1" smtClean="0">
+                <a:solidFill>
+                  <a:schemeClr val="tx1"/>
+                </a:solidFill>
+              </a:rPr>
+              <a:t>Kneebrd</a:t>
+            </a:r>
+            <a:r>
+              <a:rPr lang="fr-FR" sz="500" b="1" dirty="0" smtClean="0">
+                <a:solidFill>
+                  <a:schemeClr val="tx1"/>
+                </a:solidFill>
+              </a:rPr>
+              <a:t> </a:t>
+            </a:r>
+            <a:r>
+              <a:rPr lang="fr-FR" sz="500" b="1" dirty="0" err="1" smtClean="0">
+                <a:solidFill>
+                  <a:schemeClr val="tx1"/>
+                </a:solidFill>
+              </a:rPr>
+              <a:t>next</a:t>
+            </a:r>
+            <a:r>
+              <a:rPr lang="fr-FR" sz="500" b="1" dirty="0" smtClean="0">
+                <a:solidFill>
+                  <a:schemeClr val="tx1"/>
+                </a:solidFill>
+              </a:rPr>
+              <a:t> page</a:t>
+            </a:r>
+            <a:endParaRPr lang="fr-FR" sz="500" b="1" dirty="0">
+              <a:solidFill>
+                <a:srgbClr val="FF0000"/>
+              </a:solidFill>
+            </a:endParaRPr>
+          </a:p>
+        </p:txBody>
+      </p:sp>
+      <p:sp>
+        <p:nvSpPr>
+          <p:cNvPr id="79" name="Rectangle à coins arrondis 78"/>
+          <p:cNvSpPr/>
+          <p:nvPr/>
+        </p:nvSpPr>
+        <p:spPr>
+          <a:xfrm>
+            <a:off x="2661469" y="4617049"/>
+            <a:ext cx="536550" cy="105767"/>
+          </a:xfrm>
+          <a:prstGeom prst="roundRect">
+            <a:avLst/>
+          </a:prstGeom>
+          <a:ln/>
+        </p:spPr>
+        <p:style>
+          <a:lnRef idx="2">
+            <a:schemeClr val="accent1"/>
+          </a:lnRef>
+          <a:fillRef idx="1">
+            <a:schemeClr val="lt1"/>
+          </a:fillRef>
+          <a:effectRef idx="0">
+            <a:schemeClr val="accent1"/>
+          </a:effectRef>
+          <a:fontRef idx="minor">
+            <a:schemeClr val="dk1"/>
+          </a:fontRef>
+        </p:style>
+        <p:txBody>
+          <a:bodyPr lIns="0" tIns="0" rIns="0" bIns="0" rtlCol="0" anchor="ctr"/>
+          <a:lstStyle/>
+          <a:p>
+            <a:pPr algn="ctr"/>
+            <a:r>
+              <a:rPr lang="fr-FR" sz="500" b="1" dirty="0" err="1" smtClean="0">
+                <a:solidFill>
+                  <a:schemeClr val="tx1"/>
+                </a:solidFill>
+              </a:rPr>
+              <a:t>Kneebrd</a:t>
+            </a:r>
+            <a:r>
+              <a:rPr lang="fr-FR" sz="500" b="1" dirty="0" smtClean="0">
+                <a:solidFill>
+                  <a:schemeClr val="tx1"/>
+                </a:solidFill>
+              </a:rPr>
+              <a:t> ON/OFF</a:t>
+            </a:r>
+            <a:endParaRPr lang="fr-FR" sz="500" b="1" dirty="0">
+              <a:solidFill>
+                <a:srgbClr val="FF0000"/>
+              </a:solidFill>
+            </a:endParaRPr>
+          </a:p>
+        </p:txBody>
+      </p:sp>
+      <p:sp>
+        <p:nvSpPr>
+          <p:cNvPr id="80" name="Rectangle à coins arrondis 79"/>
+          <p:cNvSpPr/>
+          <p:nvPr/>
+        </p:nvSpPr>
+        <p:spPr>
+          <a:xfrm>
+            <a:off x="3486149" y="4987669"/>
+            <a:ext cx="434975" cy="105767"/>
+          </a:xfrm>
+          <a:prstGeom prst="roundRect">
+            <a:avLst/>
+          </a:prstGeom>
+          <a:ln/>
+        </p:spPr>
+        <p:style>
+          <a:lnRef idx="2">
+            <a:schemeClr val="accent1"/>
+          </a:lnRef>
+          <a:fillRef idx="1">
+            <a:schemeClr val="lt1"/>
+          </a:fillRef>
+          <a:effectRef idx="0">
+            <a:schemeClr val="accent1"/>
+          </a:effectRef>
+          <a:fontRef idx="minor">
+            <a:schemeClr val="dk1"/>
+          </a:fontRef>
+        </p:style>
+        <p:txBody>
+          <a:bodyPr lIns="0" tIns="0" rIns="0" bIns="0" rtlCol="0" anchor="ctr"/>
+          <a:lstStyle/>
+          <a:p>
+            <a:pPr algn="ctr"/>
+            <a:r>
+              <a:rPr lang="fr-FR" sz="500" b="1" dirty="0" smtClean="0">
+                <a:solidFill>
+                  <a:schemeClr val="tx1"/>
+                </a:solidFill>
+              </a:rPr>
+              <a:t>Zoom on Y Axis</a:t>
+            </a:r>
+            <a:endParaRPr lang="fr-FR" sz="500" b="1" dirty="0">
+              <a:solidFill>
+                <a:srgbClr val="FF0000"/>
+              </a:solidFill>
+            </a:endParaRPr>
+          </a:p>
+        </p:txBody>
+      </p:sp>
+      <p:sp>
+        <p:nvSpPr>
+          <p:cNvPr id="81" name="Rectangle à coins arrondis 80"/>
+          <p:cNvSpPr/>
+          <p:nvPr/>
+        </p:nvSpPr>
+        <p:spPr>
+          <a:xfrm>
+            <a:off x="4552385" y="3408113"/>
+            <a:ext cx="658356" cy="152400"/>
           </a:xfrm>
           <a:prstGeom prst="roundRect">
             <a:avLst/>
@@ -6311,63 +7120,12 @@
           <a:p>
             <a:pPr algn="ctr"/>
             <a:r>
-              <a:rPr lang="fr-FR" sz="400" b="1" dirty="0" smtClean="0">
-                <a:solidFill>
-                  <a:schemeClr val="tx1"/>
-                </a:solidFill>
-              </a:rPr>
-              <a:t>LTN Laser Focus</a:t>
-            </a:r>
-            <a:endParaRPr lang="fr-FR" sz="400" b="1" dirty="0">
-              <a:solidFill>
-                <a:srgbClr val="FF0000"/>
-              </a:solidFill>
-            </a:endParaRPr>
-          </a:p>
-        </p:txBody>
-      </p:sp>
-      <p:sp>
-        <p:nvSpPr>
-          <p:cNvPr id="62" name="Rectangle à coins arrondis 61"/>
-          <p:cNvSpPr/>
-          <p:nvPr/>
-        </p:nvSpPr>
-        <p:spPr>
-          <a:xfrm>
-            <a:off x="1137634" y="6269831"/>
-            <a:ext cx="331726" cy="107191"/>
-          </a:xfrm>
-          <a:prstGeom prst="roundRect">
-            <a:avLst/>
-          </a:prstGeom>
-          <a:ln/>
-        </p:spPr>
-        <p:style>
-          <a:lnRef idx="2">
-            <a:schemeClr val="dk1"/>
-          </a:lnRef>
-          <a:fillRef idx="1">
-            <a:schemeClr val="lt1"/>
-          </a:fillRef>
-          <a:effectRef idx="0">
-            <a:schemeClr val="dk1"/>
-          </a:effectRef>
-          <a:fontRef idx="minor">
-            <a:schemeClr val="dk1"/>
-          </a:fontRef>
-        </p:style>
-        <p:txBody>
-          <a:bodyPr lIns="0" tIns="0" rIns="0" bIns="0" rtlCol="0" anchor="ctr"/>
-          <a:lstStyle/>
-          <a:p>
-            <a:pPr algn="ctr"/>
-            <a:r>
-              <a:rPr lang="fr-FR" sz="500" b="1" dirty="0" err="1" smtClean="0">
-                <a:solidFill>
-                  <a:schemeClr val="tx1"/>
-                </a:solidFill>
-              </a:rPr>
-              <a:t>forward</a:t>
+              <a:rPr lang="fr-FR" sz="500" b="1" dirty="0" smtClean="0">
+                <a:solidFill>
+                  <a:schemeClr val="tx1"/>
+                </a:solidFill>
+              </a:rPr>
+              <a:t>LTN power POD</a:t>
             </a:r>
             <a:endParaRPr lang="fr-FR" sz="500" b="1" dirty="0">
               <a:solidFill>
@@ -6379,257 +7137,14 @@
       </p:sp>
       <p:sp>
         <p:nvSpPr>
-          <p:cNvPr id="64" name="Rectangle à coins arrondis 63"/>
+          <p:cNvPr id="82" name="Rectangle à coins arrondis 81"/>
           <p:cNvSpPr/>
           <p:nvPr/>
         </p:nvSpPr>
         <p:spPr>
           <a:xfrm>
-            <a:off x="1137634" y="6415046"/>
-            <a:ext cx="331726" cy="96581"/>
-          </a:xfrm>
-          <a:prstGeom prst="roundRect">
-            <a:avLst/>
-          </a:prstGeom>
-          <a:ln/>
-        </p:spPr>
-        <p:style>
-          <a:lnRef idx="2">
-            <a:schemeClr val="dk1"/>
-          </a:lnRef>
-          <a:fillRef idx="1">
-            <a:schemeClr val="lt1"/>
-          </a:fillRef>
-          <a:effectRef idx="0">
-            <a:schemeClr val="dk1"/>
-          </a:effectRef>
-          <a:fontRef idx="minor">
-            <a:schemeClr val="dk1"/>
-          </a:fontRef>
-        </p:style>
-        <p:txBody>
-          <a:bodyPr lIns="0" tIns="0" rIns="0" bIns="0" rtlCol="0" anchor="ctr"/>
-          <a:lstStyle/>
-          <a:p>
-            <a:pPr algn="ctr"/>
-            <a:r>
-              <a:rPr lang="fr-FR" sz="500" b="1" dirty="0" smtClean="0">
-                <a:solidFill>
-                  <a:schemeClr val="tx1"/>
-                </a:solidFill>
-              </a:rPr>
-              <a:t>back</a:t>
-            </a:r>
-            <a:endParaRPr lang="fr-FR" sz="500" b="1" dirty="0">
-              <a:solidFill>
-                <a:schemeClr val="tx1"/>
-              </a:solidFill>
-            </a:endParaRPr>
-          </a:p>
-        </p:txBody>
-      </p:sp>
-      <p:sp>
-        <p:nvSpPr>
-          <p:cNvPr id="65" name="Rectangle à coins arrondis 64"/>
-          <p:cNvSpPr/>
-          <p:nvPr/>
-        </p:nvSpPr>
-        <p:spPr>
-          <a:xfrm>
-            <a:off x="633780" y="5301765"/>
-            <a:ext cx="425161" cy="149450"/>
-          </a:xfrm>
-          <a:prstGeom prst="roundRect">
-            <a:avLst/>
-          </a:prstGeom>
-          <a:noFill/>
-          <a:ln w="9525" cap="flat" cmpd="sng" algn="ctr">
-            <a:solidFill>
-              <a:schemeClr val="accent6"/>
-            </a:solidFill>
-            <a:prstDash val="solid"/>
-            <a:round/>
-            <a:headEnd type="none" w="med" len="med"/>
-            <a:tailEnd type="none" w="med" len="med"/>
-          </a:ln>
-        </p:spPr>
-        <p:style>
-          <a:lnRef idx="0">
-            <a:scrgbClr r="0" g="0" b="0"/>
-          </a:lnRef>
-          <a:fillRef idx="0">
-            <a:scrgbClr r="0" g="0" b="0"/>
-          </a:fillRef>
-          <a:effectRef idx="0">
-            <a:scrgbClr r="0" g="0" b="0"/>
-          </a:effectRef>
-          <a:fontRef idx="minor">
-            <a:schemeClr val="accent6"/>
-          </a:fontRef>
-        </p:style>
-        <p:txBody>
-          <a:bodyPr lIns="0" tIns="0" rIns="0" bIns="0" rtlCol="0" anchor="ctr"/>
-          <a:lstStyle/>
-          <a:p>
-            <a:pPr algn="ctr"/>
-            <a:r>
-              <a:rPr lang="fr-FR" sz="500" b="1" dirty="0" smtClean="0">
-                <a:solidFill>
-                  <a:schemeClr val="tx1"/>
-                </a:solidFill>
-              </a:rPr>
-              <a:t>SRS 2 PTT</a:t>
-            </a:r>
-          </a:p>
-          <a:p>
-            <a:pPr algn="ctr"/>
-            <a:r>
-              <a:rPr lang="fr-FR" sz="500" b="1" dirty="0" smtClean="0">
-                <a:solidFill>
-                  <a:srgbClr val="FF0000"/>
-                </a:solidFill>
-              </a:rPr>
-              <a:t>---</a:t>
-            </a:r>
-          </a:p>
-        </p:txBody>
-      </p:sp>
-      <p:sp>
-        <p:nvSpPr>
-          <p:cNvPr id="66" name="Rectangle à coins arrondis 65"/>
-          <p:cNvSpPr/>
-          <p:nvPr/>
-        </p:nvSpPr>
-        <p:spPr>
-          <a:xfrm>
-            <a:off x="1324490" y="5121811"/>
-            <a:ext cx="425161" cy="156300"/>
-          </a:xfrm>
-          <a:prstGeom prst="roundRect">
-            <a:avLst/>
-          </a:prstGeom>
-          <a:noFill/>
-          <a:ln w="9525" cap="flat" cmpd="sng" algn="ctr">
-            <a:solidFill>
-              <a:schemeClr val="accent6"/>
-            </a:solidFill>
-            <a:prstDash val="solid"/>
-            <a:round/>
-            <a:headEnd type="none" w="med" len="med"/>
-            <a:tailEnd type="none" w="med" len="med"/>
-          </a:ln>
-        </p:spPr>
-        <p:style>
-          <a:lnRef idx="0">
-            <a:scrgbClr r="0" g="0" b="0"/>
-          </a:lnRef>
-          <a:fillRef idx="0">
-            <a:scrgbClr r="0" g="0" b="0"/>
-          </a:fillRef>
-          <a:effectRef idx="0">
-            <a:scrgbClr r="0" g="0" b="0"/>
-          </a:effectRef>
-          <a:fontRef idx="minor">
-            <a:schemeClr val="accent6"/>
-          </a:fontRef>
-        </p:style>
-        <p:txBody>
-          <a:bodyPr lIns="0" tIns="0" rIns="0" bIns="0" rtlCol="0" anchor="ctr"/>
-          <a:lstStyle/>
-          <a:p>
-            <a:pPr algn="ctr"/>
-            <a:r>
-              <a:rPr lang="fr-FR" sz="500" b="1" dirty="0" smtClean="0">
-                <a:solidFill>
-                  <a:schemeClr val="tx1"/>
-                </a:solidFill>
-              </a:rPr>
-              <a:t>ICS PTT</a:t>
-            </a:r>
-            <a:endParaRPr lang="fr-FR" sz="500" b="1" dirty="0" smtClean="0">
-              <a:solidFill>
-                <a:srgbClr val="FF0000"/>
-              </a:solidFill>
-            </a:endParaRPr>
-          </a:p>
-        </p:txBody>
-      </p:sp>
-      <p:sp>
-        <p:nvSpPr>
-          <p:cNvPr id="67" name="Rectangle à coins arrondis 66"/>
-          <p:cNvSpPr/>
-          <p:nvPr/>
-        </p:nvSpPr>
-        <p:spPr>
-          <a:xfrm>
-            <a:off x="587062" y="5125052"/>
-            <a:ext cx="425161" cy="153059"/>
-          </a:xfrm>
-          <a:prstGeom prst="roundRect">
-            <a:avLst/>
-          </a:prstGeom>
-          <a:noFill/>
-          <a:ln w="9525" cap="flat" cmpd="sng" algn="ctr">
-            <a:solidFill>
-              <a:schemeClr val="accent6"/>
-            </a:solidFill>
-            <a:prstDash val="solid"/>
-            <a:round/>
-            <a:headEnd type="none" w="med" len="med"/>
-            <a:tailEnd type="none" w="med" len="med"/>
-          </a:ln>
-        </p:spPr>
-        <p:style>
-          <a:lnRef idx="0">
-            <a:scrgbClr r="0" g="0" b="0"/>
-          </a:lnRef>
-          <a:fillRef idx="0">
-            <a:scrgbClr r="0" g="0" b="0"/>
-          </a:fillRef>
-          <a:effectRef idx="0">
-            <a:scrgbClr r="0" g="0" b="0"/>
-          </a:effectRef>
-          <a:fontRef idx="minor">
-            <a:schemeClr val="accent6"/>
-          </a:fontRef>
-        </p:style>
-        <p:txBody>
-          <a:bodyPr lIns="0" tIns="0" rIns="0" bIns="0" rtlCol="0" anchor="ctr"/>
-          <a:lstStyle/>
-          <a:p>
-            <a:pPr algn="ctr"/>
-            <a:r>
-              <a:rPr lang="fr-FR" sz="500" b="1" dirty="0" smtClean="0">
-                <a:solidFill>
-                  <a:schemeClr val="tx1"/>
-                </a:solidFill>
-              </a:rPr>
-              <a:t>COMM menu</a:t>
-            </a:r>
-          </a:p>
-          <a:p>
-            <a:pPr algn="ctr"/>
-            <a:r>
-              <a:rPr lang="fr-FR" sz="500" b="1" dirty="0" smtClean="0">
-                <a:solidFill>
-                  <a:srgbClr val="FF0000"/>
-                </a:solidFill>
-              </a:rPr>
-              <a:t>---</a:t>
-            </a:r>
-          </a:p>
-        </p:txBody>
-      </p:sp>
-      <p:sp>
-        <p:nvSpPr>
-          <p:cNvPr id="68" name="Rectangle à coins arrondis 67"/>
-          <p:cNvSpPr/>
-          <p:nvPr/>
-        </p:nvSpPr>
-        <p:spPr>
-          <a:xfrm>
-            <a:off x="1001738" y="5493916"/>
-            <a:ext cx="492063" cy="105767"/>
+            <a:off x="4552385" y="3579563"/>
+            <a:ext cx="658356" cy="152400"/>
           </a:xfrm>
           <a:prstGeom prst="roundRect">
             <a:avLst/>
@@ -6681,38 +7196,14 @@
           <a:p>
             <a:pPr algn="ctr"/>
             <a:r>
-              <a:rPr lang="fr-FR" sz="400" b="1" dirty="0" smtClean="0">
-                <a:solidFill>
-                  <a:schemeClr val="tx1"/>
-                </a:solidFill>
-              </a:rPr>
-              <a:t>LTN FOV </a:t>
-            </a:r>
-            <a:r>
-              <a:rPr lang="fr-FR" sz="400" b="1" dirty="0" err="1" smtClean="0">
-                <a:solidFill>
-                  <a:schemeClr val="tx1"/>
-                </a:solidFill>
-              </a:rPr>
-              <a:t>Toggle</a:t>
-            </a:r>
-            <a:endParaRPr lang="fr-FR" sz="400" b="1" dirty="0" smtClean="0">
-              <a:solidFill>
-                <a:schemeClr val="tx1"/>
-              </a:solidFill>
-            </a:endParaRPr>
-          </a:p>
-          <a:p>
-            <a:pPr algn="ctr"/>
-            <a:r>
-              <a:rPr lang="fr-FR" sz="400" b="1" dirty="0" smtClean="0">
-                <a:solidFill>
-                  <a:srgbClr val="FF0000"/>
-                </a:solidFill>
-              </a:rPr>
-              <a:t>Switch TCS/FLIR</a:t>
-            </a:r>
-            <a:endParaRPr lang="fr-FR" sz="400" b="1" dirty="0">
+              <a:rPr lang="fr-FR" sz="500" b="1" dirty="0" smtClean="0">
+                <a:solidFill>
+                  <a:schemeClr val="tx1"/>
+                </a:solidFill>
+              </a:rPr>
+              <a:t>LTN power IMU</a:t>
+            </a:r>
+            <a:endParaRPr lang="fr-FR" sz="500" b="1" dirty="0">
               <a:solidFill>
                 <a:srgbClr val="FF0000"/>
               </a:solidFill>
@@ -6722,14 +7213,14 @@
       </p:sp>
       <p:sp>
         <p:nvSpPr>
-          <p:cNvPr id="69" name="Rectangle à coins arrondis 68"/>
+          <p:cNvPr id="83" name="Rectangle à coins arrondis 82"/>
           <p:cNvSpPr/>
           <p:nvPr/>
         </p:nvSpPr>
         <p:spPr>
           <a:xfrm>
-            <a:off x="1001737" y="5636348"/>
-            <a:ext cx="492063" cy="104663"/>
+            <a:off x="4552385" y="3751013"/>
+            <a:ext cx="658356" cy="152400"/>
           </a:xfrm>
           <a:prstGeom prst="roundRect">
             <a:avLst/>
@@ -6781,14 +7272,14 @@
           <a:p>
             <a:pPr algn="ctr"/>
             <a:r>
-              <a:rPr lang="fr-FR" sz="400" b="1" dirty="0" smtClean="0">
-                <a:solidFill>
-                  <a:schemeClr val="tx1"/>
-                </a:solidFill>
-              </a:rPr>
-              <a:t>LTN Laser Focus</a:t>
-            </a:r>
-            <a:endParaRPr lang="fr-FR" sz="400" b="1" dirty="0">
+              <a:rPr lang="fr-FR" sz="500" b="1" dirty="0" smtClean="0">
+                <a:solidFill>
+                  <a:schemeClr val="tx1"/>
+                </a:solidFill>
+              </a:rPr>
+              <a:t>LTN Power off</a:t>
+            </a:r>
+            <a:endParaRPr lang="fr-FR" sz="500" b="1" dirty="0">
               <a:solidFill>
                 <a:srgbClr val="FF0000"/>
               </a:solidFill>
@@ -6798,14 +7289,14 @@
       </p:sp>
       <p:sp>
         <p:nvSpPr>
-          <p:cNvPr id="72" name="Rectangle à coins arrondis 71"/>
+          <p:cNvPr id="84" name="Rectangle à coins arrondis 83"/>
           <p:cNvSpPr/>
           <p:nvPr/>
         </p:nvSpPr>
         <p:spPr>
           <a:xfrm>
-            <a:off x="633780" y="5933802"/>
-            <a:ext cx="331726" cy="107191"/>
+            <a:off x="5251672" y="3406270"/>
+            <a:ext cx="331726" cy="146565"/>
           </a:xfrm>
           <a:prstGeom prst="roundRect">
             <a:avLst/>
@@ -6837,7 +7328,7 @@
                   <a:schemeClr val="tx1"/>
                 </a:solidFill>
               </a:rPr>
-              <a:t>center</a:t>
+              <a:t>up</a:t>
             </a:r>
             <a:endParaRPr lang="fr-FR" sz="500" b="1" dirty="0">
               <a:solidFill>
@@ -6849,14 +7340,14 @@
       </p:sp>
       <p:sp>
         <p:nvSpPr>
-          <p:cNvPr id="73" name="Rectangle à coins arrondis 72"/>
+          <p:cNvPr id="85" name="Rectangle à coins arrondis 84"/>
           <p:cNvSpPr/>
           <p:nvPr/>
         </p:nvSpPr>
         <p:spPr>
           <a:xfrm>
-            <a:off x="633780" y="6079017"/>
-            <a:ext cx="331726" cy="96581"/>
+            <a:off x="5251672" y="3576657"/>
+            <a:ext cx="331726" cy="146565"/>
           </a:xfrm>
           <a:prstGeom prst="roundRect">
             <a:avLst/>
@@ -6888,11 +7379,11 @@
                   <a:schemeClr val="tx1"/>
                 </a:solidFill>
               </a:rPr>
-              <a:t>back</a:t>
+              <a:t>center</a:t>
             </a:r>
             <a:endParaRPr lang="fr-FR" sz="500" b="1" dirty="0">
               <a:solidFill>
-                <a:schemeClr val="tx1"/>
+                <a:srgbClr val="FF0000"/>
               </a:solidFill>
             </a:endParaRPr>
           </a:p>
@@ -6900,14 +7391,14 @@
       </p:sp>
       <p:sp>
         <p:nvSpPr>
-          <p:cNvPr id="74" name="Rectangle à coins arrondis 73"/>
+          <p:cNvPr id="86" name="Rectangle à coins arrondis 85"/>
           <p:cNvSpPr/>
           <p:nvPr/>
         </p:nvSpPr>
         <p:spPr>
           <a:xfrm>
-            <a:off x="633780" y="5788587"/>
-            <a:ext cx="331726" cy="107191"/>
+            <a:off x="5251672" y="3751013"/>
+            <a:ext cx="331726" cy="146565"/>
           </a:xfrm>
           <a:prstGeom prst="roundRect">
             <a:avLst/>
@@ -6934,12 +7425,12 @@
           <a:p>
             <a:pPr algn="ctr"/>
             <a:r>
-              <a:rPr lang="fr-FR" sz="500" b="1" dirty="0" err="1" smtClean="0">
-                <a:solidFill>
-                  <a:schemeClr val="tx1"/>
-                </a:solidFill>
-              </a:rPr>
-              <a:t>forward</a:t>
+              <a:rPr lang="fr-FR" sz="500" b="1" dirty="0" smtClean="0">
+                <a:solidFill>
+                  <a:schemeClr val="tx1"/>
+                </a:solidFill>
+              </a:rPr>
+              <a:t>down</a:t>
             </a:r>
             <a:endParaRPr lang="fr-FR" sz="500" b="1" dirty="0">
               <a:solidFill>
@@ -6951,376 +7442,14 @@
       </p:sp>
       <p:sp>
         <p:nvSpPr>
-          <p:cNvPr id="75" name="Rectangle à coins arrondis 74"/>
+          <p:cNvPr id="94" name="Rectangle à coins arrondis 93"/>
           <p:cNvSpPr/>
           <p:nvPr/>
         </p:nvSpPr>
         <p:spPr>
           <a:xfrm>
-            <a:off x="627148" y="5495652"/>
-            <a:ext cx="331726" cy="107191"/>
-          </a:xfrm>
-          <a:prstGeom prst="roundRect">
-            <a:avLst/>
-          </a:prstGeom>
-          <a:ln/>
-        </p:spPr>
-        <p:style>
-          <a:lnRef idx="2">
-            <a:schemeClr val="dk1"/>
-          </a:lnRef>
-          <a:fillRef idx="1">
-            <a:schemeClr val="lt1"/>
-          </a:fillRef>
-          <a:effectRef idx="0">
-            <a:schemeClr val="dk1"/>
-          </a:effectRef>
-          <a:fontRef idx="minor">
-            <a:schemeClr val="dk1"/>
-          </a:fontRef>
-        </p:style>
-        <p:txBody>
-          <a:bodyPr lIns="0" tIns="0" rIns="0" bIns="0" rtlCol="0" anchor="ctr"/>
-          <a:lstStyle/>
-          <a:p>
-            <a:pPr algn="ctr"/>
-            <a:r>
-              <a:rPr lang="fr-FR" sz="500" b="1" dirty="0" err="1" smtClean="0">
-                <a:solidFill>
-                  <a:schemeClr val="tx1"/>
-                </a:solidFill>
-              </a:rPr>
-              <a:t>forward</a:t>
-            </a:r>
-            <a:endParaRPr lang="fr-FR" sz="500" b="1" dirty="0">
-              <a:solidFill>
-                <a:srgbClr val="FF0000"/>
-              </a:solidFill>
-            </a:endParaRPr>
-          </a:p>
-        </p:txBody>
-      </p:sp>
-      <p:sp>
-        <p:nvSpPr>
-          <p:cNvPr id="76" name="Rectangle à coins arrondis 75"/>
-          <p:cNvSpPr/>
-          <p:nvPr/>
-        </p:nvSpPr>
-        <p:spPr>
-          <a:xfrm>
-            <a:off x="627148" y="5640867"/>
-            <a:ext cx="331726" cy="96581"/>
-          </a:xfrm>
-          <a:prstGeom prst="roundRect">
-            <a:avLst/>
-          </a:prstGeom>
-          <a:ln/>
-        </p:spPr>
-        <p:style>
-          <a:lnRef idx="2">
-            <a:schemeClr val="dk1"/>
-          </a:lnRef>
-          <a:fillRef idx="1">
-            <a:schemeClr val="lt1"/>
-          </a:fillRef>
-          <a:effectRef idx="0">
-            <a:schemeClr val="dk1"/>
-          </a:effectRef>
-          <a:fontRef idx="minor">
-            <a:schemeClr val="dk1"/>
-          </a:fontRef>
-        </p:style>
-        <p:txBody>
-          <a:bodyPr lIns="0" tIns="0" rIns="0" bIns="0" rtlCol="0" anchor="ctr"/>
-          <a:lstStyle/>
-          <a:p>
-            <a:pPr algn="ctr"/>
-            <a:r>
-              <a:rPr lang="fr-FR" sz="500" b="1" dirty="0" smtClean="0">
-                <a:solidFill>
-                  <a:schemeClr val="tx1"/>
-                </a:solidFill>
-              </a:rPr>
-              <a:t>back</a:t>
-            </a:r>
-            <a:endParaRPr lang="fr-FR" sz="500" b="1" dirty="0">
-              <a:solidFill>
-                <a:schemeClr val="tx1"/>
-              </a:solidFill>
-            </a:endParaRPr>
-          </a:p>
-        </p:txBody>
-      </p:sp>
-      <p:sp>
-        <p:nvSpPr>
-          <p:cNvPr id="77" name="Rectangle à coins arrondis 76"/>
-          <p:cNvSpPr/>
-          <p:nvPr/>
-        </p:nvSpPr>
-        <p:spPr>
-          <a:xfrm>
-            <a:off x="2101875" y="4348536"/>
-            <a:ext cx="536550" cy="105767"/>
-          </a:xfrm>
-          <a:prstGeom prst="roundRect">
-            <a:avLst/>
-          </a:prstGeom>
-          <a:ln/>
-        </p:spPr>
-        <p:style>
-          <a:lnRef idx="2">
-            <a:schemeClr val="accent1"/>
-          </a:lnRef>
-          <a:fillRef idx="1">
-            <a:schemeClr val="lt1"/>
-          </a:fillRef>
-          <a:effectRef idx="0">
-            <a:schemeClr val="accent1"/>
-          </a:effectRef>
-          <a:fontRef idx="minor">
-            <a:schemeClr val="dk1"/>
-          </a:fontRef>
-        </p:style>
-        <p:txBody>
-          <a:bodyPr lIns="0" tIns="0" rIns="0" bIns="0" rtlCol="0" anchor="ctr"/>
-          <a:lstStyle/>
-          <a:p>
-            <a:pPr algn="ctr"/>
-            <a:r>
-              <a:rPr lang="fr-FR" sz="500" b="1" dirty="0" err="1" smtClean="0">
-                <a:solidFill>
-                  <a:schemeClr val="tx1"/>
-                </a:solidFill>
-              </a:rPr>
-              <a:t>Kneebrd</a:t>
-            </a:r>
-            <a:r>
-              <a:rPr lang="fr-FR" sz="500" b="1" dirty="0" smtClean="0">
-                <a:solidFill>
-                  <a:schemeClr val="tx1"/>
-                </a:solidFill>
-              </a:rPr>
-              <a:t> </a:t>
-            </a:r>
-            <a:r>
-              <a:rPr lang="fr-FR" sz="500" b="1" dirty="0" err="1" smtClean="0">
-                <a:solidFill>
-                  <a:schemeClr val="tx1"/>
-                </a:solidFill>
-              </a:rPr>
-              <a:t>prev</a:t>
-            </a:r>
-            <a:r>
-              <a:rPr lang="fr-FR" sz="500" b="1" dirty="0" smtClean="0">
-                <a:solidFill>
-                  <a:schemeClr val="tx1"/>
-                </a:solidFill>
-              </a:rPr>
-              <a:t> page</a:t>
-            </a:r>
-            <a:endParaRPr lang="fr-FR" sz="500" b="1" dirty="0">
-              <a:solidFill>
-                <a:srgbClr val="FF0000"/>
-              </a:solidFill>
-            </a:endParaRPr>
-          </a:p>
-        </p:txBody>
-      </p:sp>
-      <p:sp>
-        <p:nvSpPr>
-          <p:cNvPr id="78" name="Rectangle à coins arrondis 77"/>
-          <p:cNvSpPr/>
-          <p:nvPr/>
-        </p:nvSpPr>
-        <p:spPr>
-          <a:xfrm>
-            <a:off x="2101875" y="4893274"/>
-            <a:ext cx="536550" cy="105767"/>
-          </a:xfrm>
-          <a:prstGeom prst="roundRect">
-            <a:avLst/>
-          </a:prstGeom>
-          <a:ln/>
-        </p:spPr>
-        <p:style>
-          <a:lnRef idx="2">
-            <a:schemeClr val="accent1"/>
-          </a:lnRef>
-          <a:fillRef idx="1">
-            <a:schemeClr val="lt1"/>
-          </a:fillRef>
-          <a:effectRef idx="0">
-            <a:schemeClr val="accent1"/>
-          </a:effectRef>
-          <a:fontRef idx="minor">
-            <a:schemeClr val="dk1"/>
-          </a:fontRef>
-        </p:style>
-        <p:txBody>
-          <a:bodyPr lIns="0" tIns="0" rIns="0" bIns="0" rtlCol="0" anchor="ctr"/>
-          <a:lstStyle/>
-          <a:p>
-            <a:pPr algn="ctr"/>
-            <a:r>
-              <a:rPr lang="fr-FR" sz="500" b="1" dirty="0" err="1" smtClean="0">
-                <a:solidFill>
-                  <a:schemeClr val="tx1"/>
-                </a:solidFill>
-              </a:rPr>
-              <a:t>Kneebrd</a:t>
-            </a:r>
-            <a:r>
-              <a:rPr lang="fr-FR" sz="500" b="1" dirty="0" smtClean="0">
-                <a:solidFill>
-                  <a:schemeClr val="tx1"/>
-                </a:solidFill>
-              </a:rPr>
-              <a:t> </a:t>
-            </a:r>
-            <a:r>
-              <a:rPr lang="fr-FR" sz="500" b="1" dirty="0" err="1" smtClean="0">
-                <a:solidFill>
-                  <a:schemeClr val="tx1"/>
-                </a:solidFill>
-              </a:rPr>
-              <a:t>next</a:t>
-            </a:r>
-            <a:r>
-              <a:rPr lang="fr-FR" sz="500" b="1" dirty="0" smtClean="0">
-                <a:solidFill>
-                  <a:schemeClr val="tx1"/>
-                </a:solidFill>
-              </a:rPr>
-              <a:t> page</a:t>
-            </a:r>
-            <a:endParaRPr lang="fr-FR" sz="500" b="1" dirty="0">
-              <a:solidFill>
-                <a:srgbClr val="FF0000"/>
-              </a:solidFill>
-            </a:endParaRPr>
-          </a:p>
-        </p:txBody>
-      </p:sp>
-      <p:sp>
-        <p:nvSpPr>
-          <p:cNvPr id="79" name="Rectangle à coins arrondis 78"/>
-          <p:cNvSpPr/>
-          <p:nvPr/>
-        </p:nvSpPr>
-        <p:spPr>
-          <a:xfrm>
-            <a:off x="2661469" y="4617049"/>
-            <a:ext cx="536550" cy="105767"/>
-          </a:xfrm>
-          <a:prstGeom prst="roundRect">
-            <a:avLst/>
-          </a:prstGeom>
-          <a:ln/>
-        </p:spPr>
-        <p:style>
-          <a:lnRef idx="2">
-            <a:schemeClr val="accent1"/>
-          </a:lnRef>
-          <a:fillRef idx="1">
-            <a:schemeClr val="lt1"/>
-          </a:fillRef>
-          <a:effectRef idx="0">
-            <a:schemeClr val="accent1"/>
-          </a:effectRef>
-          <a:fontRef idx="minor">
-            <a:schemeClr val="dk1"/>
-          </a:fontRef>
-        </p:style>
-        <p:txBody>
-          <a:bodyPr lIns="0" tIns="0" rIns="0" bIns="0" rtlCol="0" anchor="ctr"/>
-          <a:lstStyle/>
-          <a:p>
-            <a:pPr algn="ctr"/>
-            <a:r>
-              <a:rPr lang="fr-FR" sz="500" b="1" dirty="0" err="1" smtClean="0">
-                <a:solidFill>
-                  <a:schemeClr val="tx1"/>
-                </a:solidFill>
-              </a:rPr>
-              <a:t>Kneebrd</a:t>
-            </a:r>
-            <a:r>
-              <a:rPr lang="fr-FR" sz="500" b="1" dirty="0" smtClean="0">
-                <a:solidFill>
-                  <a:schemeClr val="tx1"/>
-                </a:solidFill>
-              </a:rPr>
-              <a:t> ON/OFF</a:t>
-            </a:r>
-            <a:endParaRPr lang="fr-FR" sz="500" b="1" dirty="0">
-              <a:solidFill>
-                <a:srgbClr val="FF0000"/>
-              </a:solidFill>
-            </a:endParaRPr>
-          </a:p>
-        </p:txBody>
-      </p:sp>
-      <p:sp>
-        <p:nvSpPr>
-          <p:cNvPr id="80" name="Rectangle à coins arrondis 79"/>
-          <p:cNvSpPr/>
-          <p:nvPr/>
-        </p:nvSpPr>
-        <p:spPr>
-          <a:xfrm>
-            <a:off x="3486149" y="4987669"/>
-            <a:ext cx="434975" cy="105767"/>
-          </a:xfrm>
-          <a:prstGeom prst="roundRect">
-            <a:avLst/>
-          </a:prstGeom>
-          <a:ln/>
-        </p:spPr>
-        <p:style>
-          <a:lnRef idx="2">
-            <a:schemeClr val="accent1"/>
-          </a:lnRef>
-          <a:fillRef idx="1">
-            <a:schemeClr val="lt1"/>
-          </a:fillRef>
-          <a:effectRef idx="0">
-            <a:schemeClr val="accent1"/>
-          </a:effectRef>
-          <a:fontRef idx="minor">
-            <a:schemeClr val="dk1"/>
-          </a:fontRef>
-        </p:style>
-        <p:txBody>
-          <a:bodyPr lIns="0" tIns="0" rIns="0" bIns="0" rtlCol="0" anchor="ctr"/>
-          <a:lstStyle/>
-          <a:p>
-            <a:pPr algn="ctr"/>
-            <a:r>
-              <a:rPr lang="fr-FR" sz="500" b="1" dirty="0" smtClean="0">
-                <a:solidFill>
-                  <a:schemeClr val="tx1"/>
-                </a:solidFill>
-              </a:rPr>
-              <a:t>Zoom on Y Axis</a:t>
-            </a:r>
-            <a:endParaRPr lang="fr-FR" sz="500" b="1" dirty="0">
-              <a:solidFill>
-                <a:srgbClr val="FF0000"/>
-              </a:solidFill>
-            </a:endParaRPr>
-          </a:p>
-        </p:txBody>
-      </p:sp>
-      <p:sp>
-        <p:nvSpPr>
-          <p:cNvPr id="81" name="Rectangle à coins arrondis 80"/>
-          <p:cNvSpPr/>
-          <p:nvPr/>
-        </p:nvSpPr>
-        <p:spPr>
-          <a:xfrm>
-            <a:off x="4552385" y="3408113"/>
-            <a:ext cx="658356" cy="152400"/>
+            <a:off x="4542176" y="2113642"/>
+            <a:ext cx="492063" cy="119528"/>
           </a:xfrm>
           <a:prstGeom prst="roundRect">
             <a:avLst/>
@@ -7377,7 +7506,7 @@
                   <a:schemeClr val="tx1"/>
                 </a:solidFill>
               </a:rPr>
-              <a:t>LTN power POD</a:t>
+              <a:t>LTN Laser ARM</a:t>
             </a:r>
             <a:endParaRPr lang="fr-FR" sz="500" b="1" dirty="0">
               <a:solidFill>
@@ -7389,14 +7518,14 @@
       </p:sp>
       <p:sp>
         <p:nvSpPr>
-          <p:cNvPr id="82" name="Rectangle à coins arrondis 81"/>
+          <p:cNvPr id="95" name="Rectangle à coins arrondis 94"/>
           <p:cNvSpPr/>
           <p:nvPr/>
         </p:nvSpPr>
         <p:spPr>
           <a:xfrm>
-            <a:off x="4552385" y="3579563"/>
-            <a:ext cx="658356" cy="152400"/>
+            <a:off x="4542176" y="2261632"/>
+            <a:ext cx="492063" cy="111594"/>
           </a:xfrm>
           <a:prstGeom prst="roundRect">
             <a:avLst/>
@@ -7453,7 +7582,7 @@
                   <a:schemeClr val="tx1"/>
                 </a:solidFill>
               </a:rPr>
-              <a:t>LTN power IMU</a:t>
+              <a:t>LTN Laser SAFE</a:t>
             </a:r>
             <a:endParaRPr lang="fr-FR" sz="500" b="1" dirty="0">
               <a:solidFill>
@@ -7465,14 +7594,1036 @@
       </p:sp>
       <p:sp>
         <p:nvSpPr>
-          <p:cNvPr id="83" name="Rectangle à coins arrondis 82"/>
+          <p:cNvPr id="96" name="Rectangle à coins arrondis 95"/>
           <p:cNvSpPr/>
           <p:nvPr/>
         </p:nvSpPr>
         <p:spPr>
           <a:xfrm>
-            <a:off x="4552385" y="3751013"/>
-            <a:ext cx="658356" cy="152400"/>
+            <a:off x="5085809" y="2125979"/>
+            <a:ext cx="331726" cy="107191"/>
+          </a:xfrm>
+          <a:prstGeom prst="roundRect">
+            <a:avLst/>
+          </a:prstGeom>
+          <a:ln/>
+        </p:spPr>
+        <p:style>
+          <a:lnRef idx="2">
+            <a:schemeClr val="dk1"/>
+          </a:lnRef>
+          <a:fillRef idx="1">
+            <a:schemeClr val="lt1"/>
+          </a:fillRef>
+          <a:effectRef idx="0">
+            <a:schemeClr val="dk1"/>
+          </a:effectRef>
+          <a:fontRef idx="minor">
+            <a:schemeClr val="dk1"/>
+          </a:fontRef>
+        </p:style>
+        <p:txBody>
+          <a:bodyPr lIns="0" tIns="0" rIns="0" bIns="0" rtlCol="0" anchor="ctr"/>
+          <a:lstStyle/>
+          <a:p>
+            <a:pPr algn="ctr"/>
+            <a:r>
+              <a:rPr lang="fr-FR" sz="500" b="1" dirty="0" smtClean="0">
+                <a:solidFill>
+                  <a:schemeClr val="tx1"/>
+                </a:solidFill>
+              </a:rPr>
+              <a:t>center</a:t>
+            </a:r>
+            <a:endParaRPr lang="fr-FR" sz="500" b="1" dirty="0">
+              <a:solidFill>
+                <a:srgbClr val="FF0000"/>
+              </a:solidFill>
+            </a:endParaRPr>
+          </a:p>
+        </p:txBody>
+      </p:sp>
+      <p:sp>
+        <p:nvSpPr>
+          <p:cNvPr id="97" name="Rectangle à coins arrondis 96"/>
+          <p:cNvSpPr/>
+          <p:nvPr/>
+        </p:nvSpPr>
+        <p:spPr>
+          <a:xfrm>
+            <a:off x="5085809" y="2271194"/>
+            <a:ext cx="331726" cy="96581"/>
+          </a:xfrm>
+          <a:prstGeom prst="roundRect">
+            <a:avLst/>
+          </a:prstGeom>
+          <a:ln/>
+        </p:spPr>
+        <p:style>
+          <a:lnRef idx="2">
+            <a:schemeClr val="dk1"/>
+          </a:lnRef>
+          <a:fillRef idx="1">
+            <a:schemeClr val="lt1"/>
+          </a:fillRef>
+          <a:effectRef idx="0">
+            <a:schemeClr val="dk1"/>
+          </a:effectRef>
+          <a:fontRef idx="minor">
+            <a:schemeClr val="dk1"/>
+          </a:fontRef>
+        </p:style>
+        <p:txBody>
+          <a:bodyPr lIns="0" tIns="0" rIns="0" bIns="0" rtlCol="0" anchor="ctr"/>
+          <a:lstStyle/>
+          <a:p>
+            <a:pPr algn="ctr"/>
+            <a:r>
+              <a:rPr lang="fr-FR" sz="500" b="1" dirty="0" smtClean="0">
+                <a:solidFill>
+                  <a:schemeClr val="tx1"/>
+                </a:solidFill>
+              </a:rPr>
+              <a:t>down</a:t>
+            </a:r>
+            <a:endParaRPr lang="fr-FR" sz="500" b="1" dirty="0">
+              <a:solidFill>
+                <a:schemeClr val="tx1"/>
+              </a:solidFill>
+            </a:endParaRPr>
+          </a:p>
+        </p:txBody>
+      </p:sp>
+      <p:sp>
+        <p:nvSpPr>
+          <p:cNvPr id="98" name="Rectangle à coins arrondis 97"/>
+          <p:cNvSpPr/>
+          <p:nvPr/>
+        </p:nvSpPr>
+        <p:spPr>
+          <a:xfrm>
+            <a:off x="5085809" y="1980764"/>
+            <a:ext cx="331726" cy="107191"/>
+          </a:xfrm>
+          <a:prstGeom prst="roundRect">
+            <a:avLst/>
+          </a:prstGeom>
+          <a:ln/>
+        </p:spPr>
+        <p:style>
+          <a:lnRef idx="2">
+            <a:schemeClr val="dk1"/>
+          </a:lnRef>
+          <a:fillRef idx="1">
+            <a:schemeClr val="lt1"/>
+          </a:fillRef>
+          <a:effectRef idx="0">
+            <a:schemeClr val="dk1"/>
+          </a:effectRef>
+          <a:fontRef idx="minor">
+            <a:schemeClr val="dk1"/>
+          </a:fontRef>
+        </p:style>
+        <p:txBody>
+          <a:bodyPr lIns="0" tIns="0" rIns="0" bIns="0" rtlCol="0" anchor="ctr"/>
+          <a:lstStyle/>
+          <a:p>
+            <a:pPr algn="ctr"/>
+            <a:r>
+              <a:rPr lang="fr-FR" sz="500" b="1" dirty="0" smtClean="0">
+                <a:solidFill>
+                  <a:schemeClr val="tx1"/>
+                </a:solidFill>
+              </a:rPr>
+              <a:t>Push up</a:t>
+            </a:r>
+            <a:endParaRPr lang="fr-FR" sz="500" b="1" dirty="0">
+              <a:solidFill>
+                <a:srgbClr val="FF0000"/>
+              </a:solidFill>
+            </a:endParaRPr>
+          </a:p>
+        </p:txBody>
+      </p:sp>
+      <p:sp>
+        <p:nvSpPr>
+          <p:cNvPr id="99" name="Rectangle à coins arrondis 98"/>
+          <p:cNvSpPr/>
+          <p:nvPr/>
+        </p:nvSpPr>
+        <p:spPr>
+          <a:xfrm>
+            <a:off x="5090570" y="1623032"/>
+            <a:ext cx="331726" cy="107191"/>
+          </a:xfrm>
+          <a:prstGeom prst="roundRect">
+            <a:avLst/>
+          </a:prstGeom>
+          <a:ln/>
+        </p:spPr>
+        <p:style>
+          <a:lnRef idx="2">
+            <a:schemeClr val="dk1"/>
+          </a:lnRef>
+          <a:fillRef idx="1">
+            <a:schemeClr val="lt1"/>
+          </a:fillRef>
+          <a:effectRef idx="0">
+            <a:schemeClr val="dk1"/>
+          </a:effectRef>
+          <a:fontRef idx="minor">
+            <a:schemeClr val="dk1"/>
+          </a:fontRef>
+        </p:style>
+        <p:txBody>
+          <a:bodyPr lIns="0" tIns="0" rIns="0" bIns="0" rtlCol="0" anchor="ctr"/>
+          <a:lstStyle/>
+          <a:p>
+            <a:pPr algn="ctr"/>
+            <a:r>
+              <a:rPr lang="fr-FR" sz="500" b="1" dirty="0" smtClean="0">
+                <a:solidFill>
+                  <a:schemeClr val="tx1"/>
+                </a:solidFill>
+              </a:rPr>
+              <a:t>center</a:t>
+            </a:r>
+            <a:endParaRPr lang="fr-FR" sz="500" b="1" dirty="0">
+              <a:solidFill>
+                <a:srgbClr val="FF0000"/>
+              </a:solidFill>
+            </a:endParaRPr>
+          </a:p>
+        </p:txBody>
+      </p:sp>
+      <p:sp>
+        <p:nvSpPr>
+          <p:cNvPr id="100" name="Rectangle à coins arrondis 99"/>
+          <p:cNvSpPr/>
+          <p:nvPr/>
+        </p:nvSpPr>
+        <p:spPr>
+          <a:xfrm>
+            <a:off x="5090570" y="1768247"/>
+            <a:ext cx="331726" cy="96581"/>
+          </a:xfrm>
+          <a:prstGeom prst="roundRect">
+            <a:avLst/>
+          </a:prstGeom>
+          <a:ln/>
+        </p:spPr>
+        <p:style>
+          <a:lnRef idx="2">
+            <a:schemeClr val="dk1"/>
+          </a:lnRef>
+          <a:fillRef idx="1">
+            <a:schemeClr val="lt1"/>
+          </a:fillRef>
+          <a:effectRef idx="0">
+            <a:schemeClr val="dk1"/>
+          </a:effectRef>
+          <a:fontRef idx="minor">
+            <a:schemeClr val="dk1"/>
+          </a:fontRef>
+        </p:style>
+        <p:txBody>
+          <a:bodyPr lIns="0" tIns="0" rIns="0" bIns="0" rtlCol="0" anchor="ctr"/>
+          <a:lstStyle/>
+          <a:p>
+            <a:pPr algn="ctr"/>
+            <a:r>
+              <a:rPr lang="fr-FR" sz="500" b="1" dirty="0" smtClean="0">
+                <a:solidFill>
+                  <a:schemeClr val="tx1"/>
+                </a:solidFill>
+              </a:rPr>
+              <a:t>down</a:t>
+            </a:r>
+            <a:endParaRPr lang="fr-FR" sz="500" b="1" dirty="0">
+              <a:solidFill>
+                <a:schemeClr val="tx1"/>
+              </a:solidFill>
+            </a:endParaRPr>
+          </a:p>
+        </p:txBody>
+      </p:sp>
+      <p:sp>
+        <p:nvSpPr>
+          <p:cNvPr id="101" name="Rectangle à coins arrondis 100"/>
+          <p:cNvSpPr/>
+          <p:nvPr/>
+        </p:nvSpPr>
+        <p:spPr>
+          <a:xfrm>
+            <a:off x="5090570" y="1477817"/>
+            <a:ext cx="331726" cy="107191"/>
+          </a:xfrm>
+          <a:prstGeom prst="roundRect">
+            <a:avLst/>
+          </a:prstGeom>
+          <a:ln/>
+        </p:spPr>
+        <p:style>
+          <a:lnRef idx="2">
+            <a:schemeClr val="dk1"/>
+          </a:lnRef>
+          <a:fillRef idx="1">
+            <a:schemeClr val="lt1"/>
+          </a:fillRef>
+          <a:effectRef idx="0">
+            <a:schemeClr val="dk1"/>
+          </a:effectRef>
+          <a:fontRef idx="minor">
+            <a:schemeClr val="dk1"/>
+          </a:fontRef>
+        </p:style>
+        <p:txBody>
+          <a:bodyPr lIns="0" tIns="0" rIns="0" bIns="0" rtlCol="0" anchor="ctr"/>
+          <a:lstStyle/>
+          <a:p>
+            <a:pPr algn="ctr"/>
+            <a:r>
+              <a:rPr lang="fr-FR" sz="500" b="1" dirty="0" smtClean="0">
+                <a:solidFill>
+                  <a:schemeClr val="tx1"/>
+                </a:solidFill>
+              </a:rPr>
+              <a:t>Push up</a:t>
+            </a:r>
+            <a:endParaRPr lang="fr-FR" sz="500" b="1" dirty="0">
+              <a:solidFill>
+                <a:srgbClr val="FF0000"/>
+              </a:solidFill>
+            </a:endParaRPr>
+          </a:p>
+        </p:txBody>
+      </p:sp>
+      <p:sp>
+        <p:nvSpPr>
+          <p:cNvPr id="104" name="Rectangle à coins arrondis 103"/>
+          <p:cNvSpPr/>
+          <p:nvPr/>
+        </p:nvSpPr>
+        <p:spPr>
+          <a:xfrm>
+            <a:off x="757237" y="2699041"/>
+            <a:ext cx="254986" cy="107191"/>
+          </a:xfrm>
+          <a:prstGeom prst="roundRect">
+            <a:avLst/>
+          </a:prstGeom>
+          <a:ln/>
+        </p:spPr>
+        <p:style>
+          <a:lnRef idx="2">
+            <a:schemeClr val="dk1"/>
+          </a:lnRef>
+          <a:fillRef idx="1">
+            <a:schemeClr val="lt1"/>
+          </a:fillRef>
+          <a:effectRef idx="0">
+            <a:schemeClr val="dk1"/>
+          </a:effectRef>
+          <a:fontRef idx="minor">
+            <a:schemeClr val="dk1"/>
+          </a:fontRef>
+        </p:style>
+        <p:txBody>
+          <a:bodyPr lIns="0" tIns="0" rIns="0" bIns="0" rtlCol="0" anchor="ctr"/>
+          <a:lstStyle/>
+          <a:p>
+            <a:pPr algn="ctr"/>
+            <a:r>
+              <a:rPr lang="fr-FR" sz="500" b="1" dirty="0" smtClean="0">
+                <a:solidFill>
+                  <a:schemeClr val="tx1"/>
+                </a:solidFill>
+              </a:rPr>
+              <a:t>MR</a:t>
+            </a:r>
+            <a:endParaRPr lang="fr-FR" sz="500" b="1" dirty="0">
+              <a:solidFill>
+                <a:srgbClr val="FF0000"/>
+              </a:solidFill>
+            </a:endParaRPr>
+          </a:p>
+        </p:txBody>
+      </p:sp>
+      <p:sp>
+        <p:nvSpPr>
+          <p:cNvPr id="105" name="Rectangle à coins arrondis 104"/>
+          <p:cNvSpPr/>
+          <p:nvPr/>
+        </p:nvSpPr>
+        <p:spPr>
+          <a:xfrm>
+            <a:off x="757237" y="2844256"/>
+            <a:ext cx="254985" cy="105016"/>
+          </a:xfrm>
+          <a:prstGeom prst="roundRect">
+            <a:avLst/>
+          </a:prstGeom>
+          <a:ln/>
+        </p:spPr>
+        <p:style>
+          <a:lnRef idx="2">
+            <a:schemeClr val="dk1"/>
+          </a:lnRef>
+          <a:fillRef idx="1">
+            <a:schemeClr val="lt1"/>
+          </a:fillRef>
+          <a:effectRef idx="0">
+            <a:schemeClr val="dk1"/>
+          </a:effectRef>
+          <a:fontRef idx="minor">
+            <a:schemeClr val="dk1"/>
+          </a:fontRef>
+        </p:style>
+        <p:txBody>
+          <a:bodyPr lIns="0" tIns="0" rIns="0" bIns="0" rtlCol="0" anchor="ctr"/>
+          <a:lstStyle/>
+          <a:p>
+            <a:pPr algn="ctr"/>
+            <a:r>
+              <a:rPr lang="fr-FR" sz="500" b="1" dirty="0" smtClean="0">
+                <a:solidFill>
+                  <a:schemeClr val="tx1"/>
+                </a:solidFill>
+              </a:rPr>
+              <a:t>DN</a:t>
+            </a:r>
+            <a:endParaRPr lang="fr-FR" sz="500" b="1" dirty="0">
+              <a:solidFill>
+                <a:schemeClr val="tx1"/>
+              </a:solidFill>
+            </a:endParaRPr>
+          </a:p>
+        </p:txBody>
+      </p:sp>
+      <p:sp>
+        <p:nvSpPr>
+          <p:cNvPr id="106" name="Rectangle à coins arrondis 105"/>
+          <p:cNvSpPr/>
+          <p:nvPr/>
+        </p:nvSpPr>
+        <p:spPr>
+          <a:xfrm>
+            <a:off x="757237" y="2553826"/>
+            <a:ext cx="254986" cy="107191"/>
+          </a:xfrm>
+          <a:prstGeom prst="roundRect">
+            <a:avLst/>
+          </a:prstGeom>
+          <a:ln/>
+        </p:spPr>
+        <p:style>
+          <a:lnRef idx="2">
+            <a:schemeClr val="dk1"/>
+          </a:lnRef>
+          <a:fillRef idx="1">
+            <a:schemeClr val="lt1"/>
+          </a:fillRef>
+          <a:effectRef idx="0">
+            <a:schemeClr val="dk1"/>
+          </a:effectRef>
+          <a:fontRef idx="minor">
+            <a:schemeClr val="dk1"/>
+          </a:fontRef>
+        </p:style>
+        <p:txBody>
+          <a:bodyPr lIns="0" tIns="0" rIns="0" bIns="0" rtlCol="0" anchor="ctr"/>
+          <a:lstStyle/>
+          <a:p>
+            <a:pPr algn="ctr"/>
+            <a:r>
+              <a:rPr lang="fr-FR" sz="500" b="1" dirty="0" smtClean="0">
+                <a:solidFill>
+                  <a:schemeClr val="tx1"/>
+                </a:solidFill>
+              </a:rPr>
+              <a:t>UP</a:t>
+            </a:r>
+            <a:endParaRPr lang="fr-FR" sz="500" b="1" dirty="0">
+              <a:solidFill>
+                <a:srgbClr val="FF0000"/>
+              </a:solidFill>
+            </a:endParaRPr>
+          </a:p>
+        </p:txBody>
+      </p:sp>
+      <p:sp>
+        <p:nvSpPr>
+          <p:cNvPr id="107" name="Rectangle à coins arrondis 106"/>
+          <p:cNvSpPr/>
+          <p:nvPr/>
+        </p:nvSpPr>
+        <p:spPr>
+          <a:xfrm>
+            <a:off x="141698" y="2554537"/>
+            <a:ext cx="536550" cy="105767"/>
+          </a:xfrm>
+          <a:prstGeom prst="roundRect">
+            <a:avLst/>
+          </a:prstGeom>
+          <a:ln/>
+        </p:spPr>
+        <p:style>
+          <a:lnRef idx="2">
+            <a:schemeClr val="accent1"/>
+          </a:lnRef>
+          <a:fillRef idx="1">
+            <a:schemeClr val="lt1"/>
+          </a:fillRef>
+          <a:effectRef idx="0">
+            <a:schemeClr val="accent1"/>
+          </a:effectRef>
+          <a:fontRef idx="minor">
+            <a:schemeClr val="dk1"/>
+          </a:fontRef>
+        </p:style>
+        <p:txBody>
+          <a:bodyPr lIns="0" tIns="0" rIns="0" bIns="0" rtlCol="0" anchor="ctr"/>
+          <a:lstStyle/>
+          <a:p>
+            <a:pPr algn="ctr"/>
+            <a:r>
+              <a:rPr lang="fr-FR" sz="500" b="1" dirty="0" smtClean="0">
+                <a:solidFill>
+                  <a:schemeClr val="tx1"/>
+                </a:solidFill>
+              </a:rPr>
+              <a:t>TID range 100</a:t>
+            </a:r>
+            <a:endParaRPr lang="fr-FR" sz="500" b="1" dirty="0">
+              <a:solidFill>
+                <a:srgbClr val="FF0000"/>
+              </a:solidFill>
+            </a:endParaRPr>
+          </a:p>
+        </p:txBody>
+      </p:sp>
+      <p:sp>
+        <p:nvSpPr>
+          <p:cNvPr id="108" name="Rectangle à coins arrondis 107"/>
+          <p:cNvSpPr/>
+          <p:nvPr/>
+        </p:nvSpPr>
+        <p:spPr>
+          <a:xfrm>
+            <a:off x="141698" y="2704747"/>
+            <a:ext cx="536550" cy="105767"/>
+          </a:xfrm>
+          <a:prstGeom prst="roundRect">
+            <a:avLst/>
+          </a:prstGeom>
+          <a:ln/>
+        </p:spPr>
+        <p:style>
+          <a:lnRef idx="2">
+            <a:schemeClr val="accent1"/>
+          </a:lnRef>
+          <a:fillRef idx="1">
+            <a:schemeClr val="lt1"/>
+          </a:fillRef>
+          <a:effectRef idx="0">
+            <a:schemeClr val="accent1"/>
+          </a:effectRef>
+          <a:fontRef idx="minor">
+            <a:schemeClr val="dk1"/>
+          </a:fontRef>
+        </p:style>
+        <p:txBody>
+          <a:bodyPr lIns="0" tIns="0" rIns="0" bIns="0" rtlCol="0" anchor="ctr"/>
+          <a:lstStyle/>
+          <a:p>
+            <a:pPr algn="ctr"/>
+            <a:r>
+              <a:rPr lang="fr-FR" sz="500" b="1" dirty="0" smtClean="0">
+                <a:solidFill>
+                  <a:schemeClr val="tx1"/>
+                </a:solidFill>
+              </a:rPr>
+              <a:t>TID range 50</a:t>
+            </a:r>
+            <a:endParaRPr lang="fr-FR" sz="500" b="1" dirty="0">
+              <a:solidFill>
+                <a:srgbClr val="FF0000"/>
+              </a:solidFill>
+            </a:endParaRPr>
+          </a:p>
+        </p:txBody>
+      </p:sp>
+      <p:sp>
+        <p:nvSpPr>
+          <p:cNvPr id="109" name="Rectangle à coins arrondis 108"/>
+          <p:cNvSpPr/>
+          <p:nvPr/>
+        </p:nvSpPr>
+        <p:spPr>
+          <a:xfrm>
+            <a:off x="141698" y="2843505"/>
+            <a:ext cx="536550" cy="105767"/>
+          </a:xfrm>
+          <a:prstGeom prst="roundRect">
+            <a:avLst/>
+          </a:prstGeom>
+          <a:ln/>
+        </p:spPr>
+        <p:style>
+          <a:lnRef idx="2">
+            <a:schemeClr val="accent1"/>
+          </a:lnRef>
+          <a:fillRef idx="1">
+            <a:schemeClr val="lt1"/>
+          </a:fillRef>
+          <a:effectRef idx="0">
+            <a:schemeClr val="accent1"/>
+          </a:effectRef>
+          <a:fontRef idx="minor">
+            <a:schemeClr val="dk1"/>
+          </a:fontRef>
+        </p:style>
+        <p:txBody>
+          <a:bodyPr lIns="0" tIns="0" rIns="0" bIns="0" rtlCol="0" anchor="ctr"/>
+          <a:lstStyle/>
+          <a:p>
+            <a:pPr algn="ctr"/>
+            <a:r>
+              <a:rPr lang="fr-FR" sz="500" b="1" dirty="0" smtClean="0">
+                <a:solidFill>
+                  <a:schemeClr val="tx1"/>
+                </a:solidFill>
+              </a:rPr>
+              <a:t>TID range 25</a:t>
+            </a:r>
+            <a:endParaRPr lang="fr-FR" sz="500" b="1" dirty="0">
+              <a:solidFill>
+                <a:srgbClr val="FF0000"/>
+              </a:solidFill>
+            </a:endParaRPr>
+          </a:p>
+        </p:txBody>
+      </p:sp>
+      <p:pic>
+        <p:nvPicPr>
+          <p:cNvPr id="2" name="Image 1" descr="DCS: F-14 - Pre-Order / Gameplay Reveal Trailer - PRE ..."/>
+          <p:cNvPicPr>
+            <a:picLocks noChangeAspect="1"/>
+          </p:cNvPicPr>
+          <p:nvPr/>
+        </p:nvPicPr>
+        <p:blipFill>
+          <a:blip r:embed="rId2" cstate="print">
+            <a:extLst>
+              <a:ext uri="{28A0092B-C50C-407E-A947-70E740481C1C}">
+                <a14:useLocalDpi xmlns:a14="http://schemas.microsoft.com/office/drawing/2010/main" val="0"/>
+              </a:ext>
+            </a:extLst>
+          </a:blip>
+          <a:stretch>
+            <a:fillRect/>
+          </a:stretch>
+        </p:blipFill>
+        <p:spPr>
+          <a:xfrm>
+            <a:off x="6008228" y="5399949"/>
+            <a:ext cx="2142285" cy="1222232"/>
+          </a:xfrm>
+          <a:prstGeom prst="rect">
+            <a:avLst/>
+          </a:prstGeom>
+        </p:spPr>
+      </p:pic>
+      <p:sp>
+        <p:nvSpPr>
+          <p:cNvPr id="110" name="Rectangle à coins arrondis 109"/>
+          <p:cNvSpPr/>
+          <p:nvPr/>
+        </p:nvSpPr>
+        <p:spPr>
+          <a:xfrm>
+            <a:off x="3523095" y="93863"/>
+            <a:ext cx="1413006" cy="520231"/>
+          </a:xfrm>
+          <a:prstGeom prst="roundRect">
+            <a:avLst/>
+          </a:prstGeom>
+          <a:noFill/>
+          <a:ln w="9525" cap="flat" cmpd="sng" algn="ctr">
+            <a:solidFill>
+              <a:schemeClr val="accent5"/>
+            </a:solidFill>
+            <a:prstDash val="solid"/>
+            <a:round/>
+            <a:headEnd type="none" w="med" len="med"/>
+            <a:tailEnd type="none" w="med" len="med"/>
+          </a:ln>
+        </p:spPr>
+        <p:style>
+          <a:lnRef idx="0">
+            <a:scrgbClr r="0" g="0" b="0"/>
+          </a:lnRef>
+          <a:fillRef idx="0">
+            <a:scrgbClr r="0" g="0" b="0"/>
+          </a:fillRef>
+          <a:effectRef idx="0">
+            <a:scrgbClr r="0" g="0" b="0"/>
+          </a:effectRef>
+          <a:fontRef idx="minor">
+            <a:schemeClr val="accent5"/>
+          </a:fontRef>
+        </p:style>
+        <p:txBody>
+          <a:bodyPr lIns="0" tIns="0" rIns="0" bIns="0" rtlCol="0" anchor="ctr"/>
+          <a:lstStyle/>
+          <a:p>
+            <a:pPr algn="ctr"/>
+            <a:r>
+              <a:rPr lang="fr-FR" sz="1000" b="1" dirty="0" smtClean="0">
+                <a:ln w="0"/>
+                <a:solidFill>
+                  <a:schemeClr val="accent1"/>
+                </a:solidFill>
+                <a:effectLst>
+                  <a:outerShdw blurRad="38100" dist="25400" dir="5400000" algn="ctr" rotWithShape="0">
+                    <a:srgbClr val="6E747A">
+                      <a:alpha val="43000"/>
+                    </a:srgbClr>
+                  </a:outerShdw>
+                </a:effectLst>
+              </a:rPr>
+              <a:t>59th Gemini</a:t>
+            </a:r>
+          </a:p>
+          <a:p>
+            <a:pPr algn="ctr"/>
+            <a:r>
+              <a:rPr lang="fr-FR" sz="1000" b="1" dirty="0" smtClean="0">
+                <a:ln w="0"/>
+                <a:solidFill>
+                  <a:schemeClr val="accent1"/>
+                </a:solidFill>
+                <a:effectLst>
+                  <a:outerShdw blurRad="38100" dist="25400" dir="5400000" algn="ctr" rotWithShape="0">
+                    <a:srgbClr val="6E747A">
+                      <a:alpha val="43000"/>
+                    </a:srgbClr>
+                  </a:outerShdw>
+                </a:effectLst>
+              </a:rPr>
+              <a:t>DCS F14B – RIO </a:t>
+            </a:r>
+            <a:r>
+              <a:rPr lang="fr-FR" sz="1000" b="1" dirty="0" err="1" smtClean="0">
+                <a:ln w="0"/>
+                <a:solidFill>
+                  <a:schemeClr val="accent1"/>
+                </a:solidFill>
+                <a:effectLst>
+                  <a:outerShdw blurRad="38100" dist="25400" dir="5400000" algn="ctr" rotWithShape="0">
+                    <a:srgbClr val="6E747A">
+                      <a:alpha val="43000"/>
+                    </a:srgbClr>
+                  </a:outerShdw>
+                </a:effectLst>
+              </a:rPr>
+              <a:t>mappings</a:t>
+            </a:r>
+            <a:endParaRPr lang="fr-FR" sz="1000" b="1" dirty="0" smtClean="0">
+              <a:ln w="0"/>
+              <a:solidFill>
+                <a:schemeClr val="accent1"/>
+              </a:solidFill>
+              <a:effectLst>
+                <a:outerShdw blurRad="38100" dist="25400" dir="5400000" algn="ctr" rotWithShape="0">
+                  <a:srgbClr val="6E747A">
+                    <a:alpha val="43000"/>
+                  </a:srgbClr>
+                </a:outerShdw>
+              </a:effectLst>
+            </a:endParaRPr>
+          </a:p>
+          <a:p>
+            <a:pPr algn="ctr"/>
+            <a:r>
+              <a:rPr lang="fr-FR" sz="1000" b="1" dirty="0" smtClean="0">
+                <a:ln w="0"/>
+                <a:solidFill>
+                  <a:schemeClr val="accent1"/>
+                </a:solidFill>
+                <a:effectLst>
+                  <a:outerShdw blurRad="38100" dist="25400" dir="5400000" algn="ctr" rotWithShape="0">
+                    <a:srgbClr val="6E747A">
+                      <a:alpha val="43000"/>
+                    </a:srgbClr>
+                  </a:outerShdw>
+                </a:effectLst>
+              </a:rPr>
+              <a:t>Version 0.5.1</a:t>
+            </a:r>
+          </a:p>
+        </p:txBody>
+      </p:sp>
+      <p:sp>
+        <p:nvSpPr>
+          <p:cNvPr id="87" name="Rectangle à coins arrondis 86"/>
+          <p:cNvSpPr/>
+          <p:nvPr/>
+        </p:nvSpPr>
+        <p:spPr>
+          <a:xfrm>
+            <a:off x="437547" y="6415284"/>
+            <a:ext cx="536550" cy="105767"/>
+          </a:xfrm>
+          <a:prstGeom prst="roundRect">
+            <a:avLst/>
+          </a:prstGeom>
+          <a:ln/>
+        </p:spPr>
+        <p:style>
+          <a:lnRef idx="2">
+            <a:schemeClr val="accent1"/>
+          </a:lnRef>
+          <a:fillRef idx="1">
+            <a:schemeClr val="lt1"/>
+          </a:fillRef>
+          <a:effectRef idx="0">
+            <a:schemeClr val="accent1"/>
+          </a:effectRef>
+          <a:fontRef idx="minor">
+            <a:schemeClr val="dk1"/>
+          </a:fontRef>
+        </p:style>
+        <p:txBody>
+          <a:bodyPr lIns="0" tIns="0" rIns="0" bIns="0" rtlCol="0" anchor="ctr"/>
+          <a:lstStyle/>
+          <a:p>
+            <a:pPr algn="ctr"/>
+            <a:r>
+              <a:rPr lang="fr-FR" sz="400" b="1" dirty="0" smtClean="0">
+                <a:solidFill>
+                  <a:srgbClr val="FF0000"/>
+                </a:solidFill>
+              </a:rPr>
+              <a:t>VSL LOW</a:t>
+            </a:r>
+            <a:endParaRPr lang="fr-FR" sz="400" b="1" dirty="0">
+              <a:solidFill>
+                <a:srgbClr val="FF0000"/>
+              </a:solidFill>
+            </a:endParaRPr>
+          </a:p>
+        </p:txBody>
+      </p:sp>
+      <p:sp>
+        <p:nvSpPr>
+          <p:cNvPr id="88" name="Rectangle à coins arrondis 87"/>
+          <p:cNvSpPr/>
+          <p:nvPr/>
+        </p:nvSpPr>
+        <p:spPr>
+          <a:xfrm>
+            <a:off x="440568" y="6273034"/>
+            <a:ext cx="536550" cy="105767"/>
+          </a:xfrm>
+          <a:prstGeom prst="roundRect">
+            <a:avLst/>
+          </a:prstGeom>
+          <a:ln/>
+        </p:spPr>
+        <p:style>
+          <a:lnRef idx="2">
+            <a:schemeClr val="accent1"/>
+          </a:lnRef>
+          <a:fillRef idx="1">
+            <a:schemeClr val="lt1"/>
+          </a:fillRef>
+          <a:effectRef idx="0">
+            <a:schemeClr val="accent1"/>
+          </a:effectRef>
+          <a:fontRef idx="minor">
+            <a:schemeClr val="dk1"/>
+          </a:fontRef>
+        </p:style>
+        <p:txBody>
+          <a:bodyPr lIns="0" tIns="0" rIns="0" bIns="0" rtlCol="0" anchor="ctr"/>
+          <a:lstStyle/>
+          <a:p>
+            <a:pPr algn="ctr"/>
+            <a:r>
+              <a:rPr lang="fr-FR" sz="400" b="1" dirty="0" smtClean="0">
+                <a:solidFill>
+                  <a:srgbClr val="FF0000"/>
+                </a:solidFill>
+              </a:rPr>
+              <a:t>VSL HIGH</a:t>
+            </a:r>
+            <a:endParaRPr lang="fr-FR" sz="400" b="1" dirty="0">
+              <a:solidFill>
+                <a:srgbClr val="FF0000"/>
+              </a:solidFill>
+            </a:endParaRPr>
+          </a:p>
+        </p:txBody>
+      </p:sp>
+      <p:sp>
+        <p:nvSpPr>
+          <p:cNvPr id="89" name="Rectangle à coins arrondis 88"/>
+          <p:cNvSpPr/>
+          <p:nvPr/>
+        </p:nvSpPr>
+        <p:spPr>
+          <a:xfrm>
+            <a:off x="437547" y="5645167"/>
+            <a:ext cx="536550" cy="105767"/>
+          </a:xfrm>
+          <a:prstGeom prst="roundRect">
+            <a:avLst/>
+          </a:prstGeom>
+          <a:ln/>
+        </p:spPr>
+        <p:style>
+          <a:lnRef idx="2">
+            <a:schemeClr val="accent1"/>
+          </a:lnRef>
+          <a:fillRef idx="1">
+            <a:schemeClr val="lt1"/>
+          </a:fillRef>
+          <a:effectRef idx="0">
+            <a:schemeClr val="accent1"/>
+          </a:effectRef>
+          <a:fontRef idx="minor">
+            <a:schemeClr val="dk1"/>
+          </a:fontRef>
+        </p:style>
+        <p:txBody>
+          <a:bodyPr lIns="0" tIns="0" rIns="0" bIns="0" rtlCol="0" anchor="ctr"/>
+          <a:lstStyle/>
+          <a:p>
+            <a:pPr algn="ctr"/>
+            <a:r>
+              <a:rPr lang="fr-FR" sz="400" b="1" dirty="0" smtClean="0">
+                <a:solidFill>
+                  <a:schemeClr val="tx1"/>
+                </a:solidFill>
+              </a:rPr>
+              <a:t>CHAFF RELEASE</a:t>
+            </a:r>
+          </a:p>
+          <a:p>
+            <a:pPr algn="ctr"/>
+            <a:r>
+              <a:rPr lang="fr-FR" sz="400" b="1" dirty="0" smtClean="0">
+                <a:solidFill>
+                  <a:srgbClr val="FF0000"/>
+                </a:solidFill>
+              </a:rPr>
+              <a:t>FLARE RELEASE</a:t>
+            </a:r>
+            <a:endParaRPr lang="fr-FR" sz="400" b="1" dirty="0">
+              <a:solidFill>
+                <a:srgbClr val="FF0000"/>
+              </a:solidFill>
+            </a:endParaRPr>
+          </a:p>
+        </p:txBody>
+      </p:sp>
+      <p:sp>
+        <p:nvSpPr>
+          <p:cNvPr id="90" name="Rectangle à coins arrondis 89"/>
+          <p:cNvSpPr/>
+          <p:nvPr/>
+        </p:nvSpPr>
+        <p:spPr>
+          <a:xfrm>
+            <a:off x="438249" y="5498636"/>
+            <a:ext cx="536550" cy="105767"/>
+          </a:xfrm>
+          <a:prstGeom prst="roundRect">
+            <a:avLst/>
+          </a:prstGeom>
+          <a:ln/>
+        </p:spPr>
+        <p:style>
+          <a:lnRef idx="2">
+            <a:schemeClr val="accent1"/>
+          </a:lnRef>
+          <a:fillRef idx="1">
+            <a:schemeClr val="lt1"/>
+          </a:fillRef>
+          <a:effectRef idx="0">
+            <a:schemeClr val="accent1"/>
+          </a:effectRef>
+          <a:fontRef idx="minor">
+            <a:schemeClr val="dk1"/>
+          </a:fontRef>
+        </p:style>
+        <p:txBody>
+          <a:bodyPr lIns="0" tIns="0" rIns="0" bIns="0" rtlCol="0" anchor="ctr"/>
+          <a:lstStyle/>
+          <a:p>
+            <a:pPr algn="ctr"/>
+            <a:endParaRPr lang="fr-FR" sz="400" b="1" dirty="0">
+              <a:solidFill>
+                <a:srgbClr val="FF0000"/>
+              </a:solidFill>
+            </a:endParaRPr>
+          </a:p>
+        </p:txBody>
+      </p:sp>
+      <p:sp>
+        <p:nvSpPr>
+          <p:cNvPr id="91" name="Rectangle à coins arrondis 90"/>
+          <p:cNvSpPr/>
+          <p:nvPr/>
+        </p:nvSpPr>
+        <p:spPr>
+          <a:xfrm>
+            <a:off x="442310" y="5788587"/>
+            <a:ext cx="536550" cy="105767"/>
+          </a:xfrm>
+          <a:prstGeom prst="roundRect">
+            <a:avLst/>
+          </a:prstGeom>
+          <a:ln/>
+        </p:spPr>
+        <p:style>
+          <a:lnRef idx="2">
+            <a:schemeClr val="accent1"/>
+          </a:lnRef>
+          <a:fillRef idx="1">
+            <a:schemeClr val="lt1"/>
+          </a:fillRef>
+          <a:effectRef idx="0">
+            <a:schemeClr val="accent1"/>
+          </a:effectRef>
+          <a:fontRef idx="minor">
+            <a:schemeClr val="dk1"/>
+          </a:fontRef>
+        </p:style>
+        <p:txBody>
+          <a:bodyPr lIns="0" tIns="0" rIns="0" bIns="0" rtlCol="0" anchor="ctr"/>
+          <a:lstStyle/>
+          <a:p>
+            <a:pPr algn="ctr"/>
+            <a:endParaRPr lang="fr-FR" sz="400" b="1" dirty="0">
+              <a:solidFill>
+                <a:srgbClr val="FF0000"/>
+              </a:solidFill>
+            </a:endParaRPr>
+          </a:p>
+        </p:txBody>
+      </p:sp>
+      <p:sp>
+        <p:nvSpPr>
+          <p:cNvPr id="92" name="Rectangle à coins arrondis 91"/>
+          <p:cNvSpPr/>
+          <p:nvPr/>
+        </p:nvSpPr>
+        <p:spPr>
+          <a:xfrm>
+            <a:off x="1001048" y="5932967"/>
+            <a:ext cx="492063" cy="111594"/>
           </a:xfrm>
           <a:prstGeom prst="roundRect">
             <a:avLst/>
@@ -7524,1123 +8675,33 @@
           <a:p>
             <a:pPr algn="ctr"/>
             <a:r>
-              <a:rPr lang="fr-FR" sz="500" b="1" dirty="0" smtClean="0">
-                <a:solidFill>
-                  <a:schemeClr val="tx1"/>
-                </a:solidFill>
-              </a:rPr>
-              <a:t>LTN Power off</a:t>
-            </a:r>
-            <a:endParaRPr lang="fr-FR" sz="500" b="1" dirty="0">
+              <a:rPr lang="fr-FR" sz="400" b="1" dirty="0" smtClean="0">
+                <a:solidFill>
+                  <a:schemeClr val="tx1"/>
+                </a:solidFill>
+              </a:rPr>
+              <a:t>LTN </a:t>
+            </a:r>
+            <a:r>
+              <a:rPr lang="fr-FR" sz="400" b="1" dirty="0" smtClean="0">
+                <a:solidFill>
+                  <a:schemeClr val="tx1"/>
+                </a:solidFill>
+              </a:rPr>
+              <a:t>A/A </a:t>
+            </a:r>
+            <a:r>
+              <a:rPr lang="fr-FR" sz="400" b="1" dirty="0" smtClean="0">
+                <a:solidFill>
+                  <a:schemeClr val="tx1"/>
+                </a:solidFill>
+              </a:rPr>
+              <a:t>mode</a:t>
+            </a:r>
+            <a:endParaRPr lang="fr-FR" sz="400" b="1" dirty="0">
               <a:solidFill>
                 <a:srgbClr val="FF0000"/>
               </a:solidFill>
-            </a:endParaRPr>
-          </a:p>
-        </p:txBody>
-      </p:sp>
-      <p:sp>
-        <p:nvSpPr>
-          <p:cNvPr id="84" name="Rectangle à coins arrondis 83"/>
-          <p:cNvSpPr/>
-          <p:nvPr/>
-        </p:nvSpPr>
-        <p:spPr>
-          <a:xfrm>
-            <a:off x="5251672" y="3406270"/>
-            <a:ext cx="331726" cy="146565"/>
-          </a:xfrm>
-          <a:prstGeom prst="roundRect">
-            <a:avLst/>
-          </a:prstGeom>
-          <a:ln/>
-        </p:spPr>
-        <p:style>
-          <a:lnRef idx="2">
-            <a:schemeClr val="dk1"/>
-          </a:lnRef>
-          <a:fillRef idx="1">
-            <a:schemeClr val="lt1"/>
-          </a:fillRef>
-          <a:effectRef idx="0">
-            <a:schemeClr val="dk1"/>
-          </a:effectRef>
-          <a:fontRef idx="minor">
-            <a:schemeClr val="dk1"/>
-          </a:fontRef>
-        </p:style>
-        <p:txBody>
-          <a:bodyPr lIns="0" tIns="0" rIns="0" bIns="0" rtlCol="0" anchor="ctr"/>
-          <a:lstStyle/>
-          <a:p>
-            <a:pPr algn="ctr"/>
-            <a:r>
-              <a:rPr lang="fr-FR" sz="500" b="1" dirty="0" smtClean="0">
-                <a:solidFill>
-                  <a:schemeClr val="tx1"/>
-                </a:solidFill>
-              </a:rPr>
-              <a:t>up</a:t>
-            </a:r>
-            <a:endParaRPr lang="fr-FR" sz="500" b="1" dirty="0">
-              <a:solidFill>
-                <a:srgbClr val="FF0000"/>
-              </a:solidFill>
-            </a:endParaRPr>
-          </a:p>
-        </p:txBody>
-      </p:sp>
-      <p:sp>
-        <p:nvSpPr>
-          <p:cNvPr id="85" name="Rectangle à coins arrondis 84"/>
-          <p:cNvSpPr/>
-          <p:nvPr/>
-        </p:nvSpPr>
-        <p:spPr>
-          <a:xfrm>
-            <a:off x="5251672" y="3576657"/>
-            <a:ext cx="331726" cy="146565"/>
-          </a:xfrm>
-          <a:prstGeom prst="roundRect">
-            <a:avLst/>
-          </a:prstGeom>
-          <a:ln/>
-        </p:spPr>
-        <p:style>
-          <a:lnRef idx="2">
-            <a:schemeClr val="dk1"/>
-          </a:lnRef>
-          <a:fillRef idx="1">
-            <a:schemeClr val="lt1"/>
-          </a:fillRef>
-          <a:effectRef idx="0">
-            <a:schemeClr val="dk1"/>
-          </a:effectRef>
-          <a:fontRef idx="minor">
-            <a:schemeClr val="dk1"/>
-          </a:fontRef>
-        </p:style>
-        <p:txBody>
-          <a:bodyPr lIns="0" tIns="0" rIns="0" bIns="0" rtlCol="0" anchor="ctr"/>
-          <a:lstStyle/>
-          <a:p>
-            <a:pPr algn="ctr"/>
-            <a:r>
-              <a:rPr lang="fr-FR" sz="500" b="1" dirty="0" smtClean="0">
-                <a:solidFill>
-                  <a:schemeClr val="tx1"/>
-                </a:solidFill>
-              </a:rPr>
-              <a:t>center</a:t>
-            </a:r>
-            <a:endParaRPr lang="fr-FR" sz="500" b="1" dirty="0">
-              <a:solidFill>
-                <a:srgbClr val="FF0000"/>
-              </a:solidFill>
-            </a:endParaRPr>
-          </a:p>
-        </p:txBody>
-      </p:sp>
-      <p:sp>
-        <p:nvSpPr>
-          <p:cNvPr id="86" name="Rectangle à coins arrondis 85"/>
-          <p:cNvSpPr/>
-          <p:nvPr/>
-        </p:nvSpPr>
-        <p:spPr>
-          <a:xfrm>
-            <a:off x="5251672" y="3751013"/>
-            <a:ext cx="331726" cy="146565"/>
-          </a:xfrm>
-          <a:prstGeom prst="roundRect">
-            <a:avLst/>
-          </a:prstGeom>
-          <a:ln/>
-        </p:spPr>
-        <p:style>
-          <a:lnRef idx="2">
-            <a:schemeClr val="dk1"/>
-          </a:lnRef>
-          <a:fillRef idx="1">
-            <a:schemeClr val="lt1"/>
-          </a:fillRef>
-          <a:effectRef idx="0">
-            <a:schemeClr val="dk1"/>
-          </a:effectRef>
-          <a:fontRef idx="minor">
-            <a:schemeClr val="dk1"/>
-          </a:fontRef>
-        </p:style>
-        <p:txBody>
-          <a:bodyPr lIns="0" tIns="0" rIns="0" bIns="0" rtlCol="0" anchor="ctr"/>
-          <a:lstStyle/>
-          <a:p>
-            <a:pPr algn="ctr"/>
-            <a:r>
-              <a:rPr lang="fr-FR" sz="500" b="1" dirty="0" smtClean="0">
-                <a:solidFill>
-                  <a:schemeClr val="tx1"/>
-                </a:solidFill>
-              </a:rPr>
-              <a:t>down</a:t>
-            </a:r>
-            <a:endParaRPr lang="fr-FR" sz="500" b="1" dirty="0">
-              <a:solidFill>
-                <a:srgbClr val="FF0000"/>
-              </a:solidFill>
-            </a:endParaRPr>
-          </a:p>
-        </p:txBody>
-      </p:sp>
-      <p:sp>
-        <p:nvSpPr>
-          <p:cNvPr id="94" name="Rectangle à coins arrondis 93"/>
-          <p:cNvSpPr/>
-          <p:nvPr/>
-        </p:nvSpPr>
-        <p:spPr>
-          <a:xfrm>
-            <a:off x="4542176" y="2113642"/>
-            <a:ext cx="492063" cy="119528"/>
-          </a:xfrm>
-          <a:prstGeom prst="roundRect">
-            <a:avLst/>
-          </a:prstGeom>
-          <a:gradFill flip="none" rotWithShape="1">
-            <a:gsLst>
-              <a:gs pos="0">
-                <a:schemeClr val="accent1">
-                  <a:lumMod val="67000"/>
-                </a:schemeClr>
-              </a:gs>
-              <a:gs pos="48000">
-                <a:schemeClr val="accent1">
-                  <a:lumMod val="97000"/>
-                  <a:lumOff val="3000"/>
-                </a:schemeClr>
-              </a:gs>
-              <a:gs pos="100000">
-                <a:schemeClr val="accent1">
-                  <a:lumMod val="60000"/>
-                  <a:lumOff val="40000"/>
-                </a:schemeClr>
-              </a:gs>
-            </a:gsLst>
-            <a:lin ang="16200000" scaled="1"/>
-            <a:tileRect/>
-          </a:gradFill>
-          <a:ln>
-            <a:noFill/>
-          </a:ln>
-        </p:spPr>
-        <p:style>
-          <a:lnRef idx="0">
-            <a:scrgbClr r="0" g="0" b="0"/>
-          </a:lnRef>
-          <a:fillRef idx="0">
-            <a:scrgbClr r="0" g="0" b="0"/>
-          </a:fillRef>
-          <a:effectRef idx="0">
-            <a:scrgbClr r="0" g="0" b="0"/>
-          </a:effectRef>
-          <a:fontRef idx="minor">
-            <a:schemeClr val="lt1"/>
-          </a:fontRef>
-        </p:style>
-        <p:txBody>
-          <a:bodyPr lIns="0" tIns="0" rIns="0" bIns="0" rtlCol="0" anchor="ctr"/>
-          <a:lstStyle/>
-          <a:p>
-            <a:pPr algn="ctr"/>
-            <a:r>
-              <a:rPr lang="fr-FR" sz="500" b="1" dirty="0" smtClean="0">
-                <a:solidFill>
-                  <a:schemeClr val="tx1"/>
-                </a:solidFill>
-              </a:rPr>
-              <a:t>LTN Laser ARM</a:t>
-            </a:r>
-            <a:endParaRPr lang="fr-FR" sz="500" b="1" dirty="0">
-              <a:solidFill>
-                <a:srgbClr val="FF0000"/>
-              </a:solidFill>
-            </a:endParaRPr>
-          </a:p>
-        </p:txBody>
-      </p:sp>
-      <p:sp>
-        <p:nvSpPr>
-          <p:cNvPr id="95" name="Rectangle à coins arrondis 94"/>
-          <p:cNvSpPr/>
-          <p:nvPr/>
-        </p:nvSpPr>
-        <p:spPr>
-          <a:xfrm>
-            <a:off x="4542176" y="2261632"/>
-            <a:ext cx="492063" cy="111594"/>
-          </a:xfrm>
-          <a:prstGeom prst="roundRect">
-            <a:avLst/>
-          </a:prstGeom>
-          <a:gradFill flip="none" rotWithShape="1">
-            <a:gsLst>
-              <a:gs pos="0">
-                <a:schemeClr val="accent1">
-                  <a:lumMod val="67000"/>
-                </a:schemeClr>
-              </a:gs>
-              <a:gs pos="48000">
-                <a:schemeClr val="accent1">
-                  <a:lumMod val="97000"/>
-                  <a:lumOff val="3000"/>
-                </a:schemeClr>
-              </a:gs>
-              <a:gs pos="100000">
-                <a:schemeClr val="accent1">
-                  <a:lumMod val="60000"/>
-                  <a:lumOff val="40000"/>
-                </a:schemeClr>
-              </a:gs>
-            </a:gsLst>
-            <a:lin ang="16200000" scaled="1"/>
-            <a:tileRect/>
-          </a:gradFill>
-          <a:ln>
-            <a:noFill/>
-          </a:ln>
-        </p:spPr>
-        <p:style>
-          <a:lnRef idx="0">
-            <a:scrgbClr r="0" g="0" b="0"/>
-          </a:lnRef>
-          <a:fillRef idx="0">
-            <a:scrgbClr r="0" g="0" b="0"/>
-          </a:fillRef>
-          <a:effectRef idx="0">
-            <a:scrgbClr r="0" g="0" b="0"/>
-          </a:effectRef>
-          <a:fontRef idx="minor">
-            <a:schemeClr val="lt1"/>
-          </a:fontRef>
-        </p:style>
-        <p:txBody>
-          <a:bodyPr lIns="0" tIns="0" rIns="0" bIns="0" rtlCol="0" anchor="ctr"/>
-          <a:lstStyle/>
-          <a:p>
-            <a:pPr algn="ctr"/>
-            <a:r>
-              <a:rPr lang="fr-FR" sz="500" b="1" dirty="0" smtClean="0">
-                <a:solidFill>
-                  <a:schemeClr val="tx1"/>
-                </a:solidFill>
-              </a:rPr>
-              <a:t>LTN Laser SAFE</a:t>
-            </a:r>
-            <a:endParaRPr lang="fr-FR" sz="500" b="1" dirty="0">
-              <a:solidFill>
-                <a:srgbClr val="FF0000"/>
-              </a:solidFill>
-            </a:endParaRPr>
-          </a:p>
-        </p:txBody>
-      </p:sp>
-      <p:sp>
-        <p:nvSpPr>
-          <p:cNvPr id="96" name="Rectangle à coins arrondis 95"/>
-          <p:cNvSpPr/>
-          <p:nvPr/>
-        </p:nvSpPr>
-        <p:spPr>
-          <a:xfrm>
-            <a:off x="5085809" y="2125979"/>
-            <a:ext cx="331726" cy="107191"/>
-          </a:xfrm>
-          <a:prstGeom prst="roundRect">
-            <a:avLst/>
-          </a:prstGeom>
-          <a:ln/>
-        </p:spPr>
-        <p:style>
-          <a:lnRef idx="2">
-            <a:schemeClr val="dk1"/>
-          </a:lnRef>
-          <a:fillRef idx="1">
-            <a:schemeClr val="lt1"/>
-          </a:fillRef>
-          <a:effectRef idx="0">
-            <a:schemeClr val="dk1"/>
-          </a:effectRef>
-          <a:fontRef idx="minor">
-            <a:schemeClr val="dk1"/>
-          </a:fontRef>
-        </p:style>
-        <p:txBody>
-          <a:bodyPr lIns="0" tIns="0" rIns="0" bIns="0" rtlCol="0" anchor="ctr"/>
-          <a:lstStyle/>
-          <a:p>
-            <a:pPr algn="ctr"/>
-            <a:r>
-              <a:rPr lang="fr-FR" sz="500" b="1" dirty="0" smtClean="0">
-                <a:solidFill>
-                  <a:schemeClr val="tx1"/>
-                </a:solidFill>
-              </a:rPr>
-              <a:t>center</a:t>
-            </a:r>
-            <a:endParaRPr lang="fr-FR" sz="500" b="1" dirty="0">
-              <a:solidFill>
-                <a:srgbClr val="FF0000"/>
-              </a:solidFill>
-            </a:endParaRPr>
-          </a:p>
-        </p:txBody>
-      </p:sp>
-      <p:sp>
-        <p:nvSpPr>
-          <p:cNvPr id="97" name="Rectangle à coins arrondis 96"/>
-          <p:cNvSpPr/>
-          <p:nvPr/>
-        </p:nvSpPr>
-        <p:spPr>
-          <a:xfrm>
-            <a:off x="5085809" y="2271194"/>
-            <a:ext cx="331726" cy="96581"/>
-          </a:xfrm>
-          <a:prstGeom prst="roundRect">
-            <a:avLst/>
-          </a:prstGeom>
-          <a:ln/>
-        </p:spPr>
-        <p:style>
-          <a:lnRef idx="2">
-            <a:schemeClr val="dk1"/>
-          </a:lnRef>
-          <a:fillRef idx="1">
-            <a:schemeClr val="lt1"/>
-          </a:fillRef>
-          <a:effectRef idx="0">
-            <a:schemeClr val="dk1"/>
-          </a:effectRef>
-          <a:fontRef idx="minor">
-            <a:schemeClr val="dk1"/>
-          </a:fontRef>
-        </p:style>
-        <p:txBody>
-          <a:bodyPr lIns="0" tIns="0" rIns="0" bIns="0" rtlCol="0" anchor="ctr"/>
-          <a:lstStyle/>
-          <a:p>
-            <a:pPr algn="ctr"/>
-            <a:r>
-              <a:rPr lang="fr-FR" sz="500" b="1" dirty="0" smtClean="0">
-                <a:solidFill>
-                  <a:schemeClr val="tx1"/>
-                </a:solidFill>
-              </a:rPr>
-              <a:t>down</a:t>
-            </a:r>
-            <a:endParaRPr lang="fr-FR" sz="500" b="1" dirty="0">
-              <a:solidFill>
-                <a:schemeClr val="tx1"/>
-              </a:solidFill>
-            </a:endParaRPr>
-          </a:p>
-        </p:txBody>
-      </p:sp>
-      <p:sp>
-        <p:nvSpPr>
-          <p:cNvPr id="98" name="Rectangle à coins arrondis 97"/>
-          <p:cNvSpPr/>
-          <p:nvPr/>
-        </p:nvSpPr>
-        <p:spPr>
-          <a:xfrm>
-            <a:off x="5085809" y="1980764"/>
-            <a:ext cx="331726" cy="107191"/>
-          </a:xfrm>
-          <a:prstGeom prst="roundRect">
-            <a:avLst/>
-          </a:prstGeom>
-          <a:ln/>
-        </p:spPr>
-        <p:style>
-          <a:lnRef idx="2">
-            <a:schemeClr val="dk1"/>
-          </a:lnRef>
-          <a:fillRef idx="1">
-            <a:schemeClr val="lt1"/>
-          </a:fillRef>
-          <a:effectRef idx="0">
-            <a:schemeClr val="dk1"/>
-          </a:effectRef>
-          <a:fontRef idx="minor">
-            <a:schemeClr val="dk1"/>
-          </a:fontRef>
-        </p:style>
-        <p:txBody>
-          <a:bodyPr lIns="0" tIns="0" rIns="0" bIns="0" rtlCol="0" anchor="ctr"/>
-          <a:lstStyle/>
-          <a:p>
-            <a:pPr algn="ctr"/>
-            <a:r>
-              <a:rPr lang="fr-FR" sz="500" b="1" dirty="0" smtClean="0">
-                <a:solidFill>
-                  <a:schemeClr val="tx1"/>
-                </a:solidFill>
-              </a:rPr>
-              <a:t>Push up</a:t>
-            </a:r>
-            <a:endParaRPr lang="fr-FR" sz="500" b="1" dirty="0">
-              <a:solidFill>
-                <a:srgbClr val="FF0000"/>
-              </a:solidFill>
-            </a:endParaRPr>
-          </a:p>
-        </p:txBody>
-      </p:sp>
-      <p:sp>
-        <p:nvSpPr>
-          <p:cNvPr id="99" name="Rectangle à coins arrondis 98"/>
-          <p:cNvSpPr/>
-          <p:nvPr/>
-        </p:nvSpPr>
-        <p:spPr>
-          <a:xfrm>
-            <a:off x="5090570" y="1623032"/>
-            <a:ext cx="331726" cy="107191"/>
-          </a:xfrm>
-          <a:prstGeom prst="roundRect">
-            <a:avLst/>
-          </a:prstGeom>
-          <a:ln/>
-        </p:spPr>
-        <p:style>
-          <a:lnRef idx="2">
-            <a:schemeClr val="dk1"/>
-          </a:lnRef>
-          <a:fillRef idx="1">
-            <a:schemeClr val="lt1"/>
-          </a:fillRef>
-          <a:effectRef idx="0">
-            <a:schemeClr val="dk1"/>
-          </a:effectRef>
-          <a:fontRef idx="minor">
-            <a:schemeClr val="dk1"/>
-          </a:fontRef>
-        </p:style>
-        <p:txBody>
-          <a:bodyPr lIns="0" tIns="0" rIns="0" bIns="0" rtlCol="0" anchor="ctr"/>
-          <a:lstStyle/>
-          <a:p>
-            <a:pPr algn="ctr"/>
-            <a:r>
-              <a:rPr lang="fr-FR" sz="500" b="1" dirty="0" smtClean="0">
-                <a:solidFill>
-                  <a:schemeClr val="tx1"/>
-                </a:solidFill>
-              </a:rPr>
-              <a:t>center</a:t>
-            </a:r>
-            <a:endParaRPr lang="fr-FR" sz="500" b="1" dirty="0">
-              <a:solidFill>
-                <a:srgbClr val="FF0000"/>
-              </a:solidFill>
-            </a:endParaRPr>
-          </a:p>
-        </p:txBody>
-      </p:sp>
-      <p:sp>
-        <p:nvSpPr>
-          <p:cNvPr id="100" name="Rectangle à coins arrondis 99"/>
-          <p:cNvSpPr/>
-          <p:nvPr/>
-        </p:nvSpPr>
-        <p:spPr>
-          <a:xfrm>
-            <a:off x="5090570" y="1768247"/>
-            <a:ext cx="331726" cy="96581"/>
-          </a:xfrm>
-          <a:prstGeom prst="roundRect">
-            <a:avLst/>
-          </a:prstGeom>
-          <a:ln/>
-        </p:spPr>
-        <p:style>
-          <a:lnRef idx="2">
-            <a:schemeClr val="dk1"/>
-          </a:lnRef>
-          <a:fillRef idx="1">
-            <a:schemeClr val="lt1"/>
-          </a:fillRef>
-          <a:effectRef idx="0">
-            <a:schemeClr val="dk1"/>
-          </a:effectRef>
-          <a:fontRef idx="minor">
-            <a:schemeClr val="dk1"/>
-          </a:fontRef>
-        </p:style>
-        <p:txBody>
-          <a:bodyPr lIns="0" tIns="0" rIns="0" bIns="0" rtlCol="0" anchor="ctr"/>
-          <a:lstStyle/>
-          <a:p>
-            <a:pPr algn="ctr"/>
-            <a:r>
-              <a:rPr lang="fr-FR" sz="500" b="1" dirty="0" smtClean="0">
-                <a:solidFill>
-                  <a:schemeClr val="tx1"/>
-                </a:solidFill>
-              </a:rPr>
-              <a:t>down</a:t>
-            </a:r>
-            <a:endParaRPr lang="fr-FR" sz="500" b="1" dirty="0">
-              <a:solidFill>
-                <a:schemeClr val="tx1"/>
-              </a:solidFill>
-            </a:endParaRPr>
-          </a:p>
-        </p:txBody>
-      </p:sp>
-      <p:sp>
-        <p:nvSpPr>
-          <p:cNvPr id="101" name="Rectangle à coins arrondis 100"/>
-          <p:cNvSpPr/>
-          <p:nvPr/>
-        </p:nvSpPr>
-        <p:spPr>
-          <a:xfrm>
-            <a:off x="5090570" y="1477817"/>
-            <a:ext cx="331726" cy="107191"/>
-          </a:xfrm>
-          <a:prstGeom prst="roundRect">
-            <a:avLst/>
-          </a:prstGeom>
-          <a:ln/>
-        </p:spPr>
-        <p:style>
-          <a:lnRef idx="2">
-            <a:schemeClr val="dk1"/>
-          </a:lnRef>
-          <a:fillRef idx="1">
-            <a:schemeClr val="lt1"/>
-          </a:fillRef>
-          <a:effectRef idx="0">
-            <a:schemeClr val="dk1"/>
-          </a:effectRef>
-          <a:fontRef idx="minor">
-            <a:schemeClr val="dk1"/>
-          </a:fontRef>
-        </p:style>
-        <p:txBody>
-          <a:bodyPr lIns="0" tIns="0" rIns="0" bIns="0" rtlCol="0" anchor="ctr"/>
-          <a:lstStyle/>
-          <a:p>
-            <a:pPr algn="ctr"/>
-            <a:r>
-              <a:rPr lang="fr-FR" sz="500" b="1" dirty="0" smtClean="0">
-                <a:solidFill>
-                  <a:schemeClr val="tx1"/>
-                </a:solidFill>
-              </a:rPr>
-              <a:t>Push up</a:t>
-            </a:r>
-            <a:endParaRPr lang="fr-FR" sz="500" b="1" dirty="0">
-              <a:solidFill>
-                <a:srgbClr val="FF0000"/>
-              </a:solidFill>
-            </a:endParaRPr>
-          </a:p>
-        </p:txBody>
-      </p:sp>
-      <p:sp>
-        <p:nvSpPr>
-          <p:cNvPr id="104" name="Rectangle à coins arrondis 103"/>
-          <p:cNvSpPr/>
-          <p:nvPr/>
-        </p:nvSpPr>
-        <p:spPr>
-          <a:xfrm>
-            <a:off x="757237" y="2699041"/>
-            <a:ext cx="254986" cy="107191"/>
-          </a:xfrm>
-          <a:prstGeom prst="roundRect">
-            <a:avLst/>
-          </a:prstGeom>
-          <a:ln/>
-        </p:spPr>
-        <p:style>
-          <a:lnRef idx="2">
-            <a:schemeClr val="dk1"/>
-          </a:lnRef>
-          <a:fillRef idx="1">
-            <a:schemeClr val="lt1"/>
-          </a:fillRef>
-          <a:effectRef idx="0">
-            <a:schemeClr val="dk1"/>
-          </a:effectRef>
-          <a:fontRef idx="minor">
-            <a:schemeClr val="dk1"/>
-          </a:fontRef>
-        </p:style>
-        <p:txBody>
-          <a:bodyPr lIns="0" tIns="0" rIns="0" bIns="0" rtlCol="0" anchor="ctr"/>
-          <a:lstStyle/>
-          <a:p>
-            <a:pPr algn="ctr"/>
-            <a:r>
-              <a:rPr lang="fr-FR" sz="500" b="1" dirty="0" smtClean="0">
-                <a:solidFill>
-                  <a:schemeClr val="tx1"/>
-                </a:solidFill>
-              </a:rPr>
-              <a:t>MR</a:t>
-            </a:r>
-            <a:endParaRPr lang="fr-FR" sz="500" b="1" dirty="0">
-              <a:solidFill>
-                <a:srgbClr val="FF0000"/>
-              </a:solidFill>
-            </a:endParaRPr>
-          </a:p>
-        </p:txBody>
-      </p:sp>
-      <p:sp>
-        <p:nvSpPr>
-          <p:cNvPr id="105" name="Rectangle à coins arrondis 104"/>
-          <p:cNvSpPr/>
-          <p:nvPr/>
-        </p:nvSpPr>
-        <p:spPr>
-          <a:xfrm>
-            <a:off x="757237" y="2844256"/>
-            <a:ext cx="254985" cy="105016"/>
-          </a:xfrm>
-          <a:prstGeom prst="roundRect">
-            <a:avLst/>
-          </a:prstGeom>
-          <a:ln/>
-        </p:spPr>
-        <p:style>
-          <a:lnRef idx="2">
-            <a:schemeClr val="dk1"/>
-          </a:lnRef>
-          <a:fillRef idx="1">
-            <a:schemeClr val="lt1"/>
-          </a:fillRef>
-          <a:effectRef idx="0">
-            <a:schemeClr val="dk1"/>
-          </a:effectRef>
-          <a:fontRef idx="minor">
-            <a:schemeClr val="dk1"/>
-          </a:fontRef>
-        </p:style>
-        <p:txBody>
-          <a:bodyPr lIns="0" tIns="0" rIns="0" bIns="0" rtlCol="0" anchor="ctr"/>
-          <a:lstStyle/>
-          <a:p>
-            <a:pPr algn="ctr"/>
-            <a:r>
-              <a:rPr lang="fr-FR" sz="500" b="1" dirty="0" smtClean="0">
-                <a:solidFill>
-                  <a:schemeClr val="tx1"/>
-                </a:solidFill>
-              </a:rPr>
-              <a:t>DN</a:t>
-            </a:r>
-            <a:endParaRPr lang="fr-FR" sz="500" b="1" dirty="0">
-              <a:solidFill>
-                <a:schemeClr val="tx1"/>
-              </a:solidFill>
-            </a:endParaRPr>
-          </a:p>
-        </p:txBody>
-      </p:sp>
-      <p:sp>
-        <p:nvSpPr>
-          <p:cNvPr id="106" name="Rectangle à coins arrondis 105"/>
-          <p:cNvSpPr/>
-          <p:nvPr/>
-        </p:nvSpPr>
-        <p:spPr>
-          <a:xfrm>
-            <a:off x="757237" y="2553826"/>
-            <a:ext cx="254986" cy="107191"/>
-          </a:xfrm>
-          <a:prstGeom prst="roundRect">
-            <a:avLst/>
-          </a:prstGeom>
-          <a:ln/>
-        </p:spPr>
-        <p:style>
-          <a:lnRef idx="2">
-            <a:schemeClr val="dk1"/>
-          </a:lnRef>
-          <a:fillRef idx="1">
-            <a:schemeClr val="lt1"/>
-          </a:fillRef>
-          <a:effectRef idx="0">
-            <a:schemeClr val="dk1"/>
-          </a:effectRef>
-          <a:fontRef idx="minor">
-            <a:schemeClr val="dk1"/>
-          </a:fontRef>
-        </p:style>
-        <p:txBody>
-          <a:bodyPr lIns="0" tIns="0" rIns="0" bIns="0" rtlCol="0" anchor="ctr"/>
-          <a:lstStyle/>
-          <a:p>
-            <a:pPr algn="ctr"/>
-            <a:r>
-              <a:rPr lang="fr-FR" sz="500" b="1" dirty="0" smtClean="0">
-                <a:solidFill>
-                  <a:schemeClr val="tx1"/>
-                </a:solidFill>
-              </a:rPr>
-              <a:t>UP</a:t>
-            </a:r>
-            <a:endParaRPr lang="fr-FR" sz="500" b="1" dirty="0">
-              <a:solidFill>
-                <a:srgbClr val="FF0000"/>
-              </a:solidFill>
-            </a:endParaRPr>
-          </a:p>
-        </p:txBody>
-      </p:sp>
-      <p:sp>
-        <p:nvSpPr>
-          <p:cNvPr id="107" name="Rectangle à coins arrondis 106"/>
-          <p:cNvSpPr/>
-          <p:nvPr/>
-        </p:nvSpPr>
-        <p:spPr>
-          <a:xfrm>
-            <a:off x="141698" y="2554537"/>
-            <a:ext cx="536550" cy="105767"/>
-          </a:xfrm>
-          <a:prstGeom prst="roundRect">
-            <a:avLst/>
-          </a:prstGeom>
-          <a:ln/>
-        </p:spPr>
-        <p:style>
-          <a:lnRef idx="2">
-            <a:schemeClr val="accent1"/>
-          </a:lnRef>
-          <a:fillRef idx="1">
-            <a:schemeClr val="lt1"/>
-          </a:fillRef>
-          <a:effectRef idx="0">
-            <a:schemeClr val="accent1"/>
-          </a:effectRef>
-          <a:fontRef idx="minor">
-            <a:schemeClr val="dk1"/>
-          </a:fontRef>
-        </p:style>
-        <p:txBody>
-          <a:bodyPr lIns="0" tIns="0" rIns="0" bIns="0" rtlCol="0" anchor="ctr"/>
-          <a:lstStyle/>
-          <a:p>
-            <a:pPr algn="ctr"/>
-            <a:r>
-              <a:rPr lang="fr-FR" sz="500" b="1" dirty="0" smtClean="0">
-                <a:solidFill>
-                  <a:schemeClr val="tx1"/>
-                </a:solidFill>
-              </a:rPr>
-              <a:t>TID range 100</a:t>
-            </a:r>
-            <a:endParaRPr lang="fr-FR" sz="500" b="1" dirty="0">
-              <a:solidFill>
-                <a:srgbClr val="FF0000"/>
-              </a:solidFill>
-            </a:endParaRPr>
-          </a:p>
-        </p:txBody>
-      </p:sp>
-      <p:sp>
-        <p:nvSpPr>
-          <p:cNvPr id="108" name="Rectangle à coins arrondis 107"/>
-          <p:cNvSpPr/>
-          <p:nvPr/>
-        </p:nvSpPr>
-        <p:spPr>
-          <a:xfrm>
-            <a:off x="141698" y="2704747"/>
-            <a:ext cx="536550" cy="105767"/>
-          </a:xfrm>
-          <a:prstGeom prst="roundRect">
-            <a:avLst/>
-          </a:prstGeom>
-          <a:ln/>
-        </p:spPr>
-        <p:style>
-          <a:lnRef idx="2">
-            <a:schemeClr val="accent1"/>
-          </a:lnRef>
-          <a:fillRef idx="1">
-            <a:schemeClr val="lt1"/>
-          </a:fillRef>
-          <a:effectRef idx="0">
-            <a:schemeClr val="accent1"/>
-          </a:effectRef>
-          <a:fontRef idx="minor">
-            <a:schemeClr val="dk1"/>
-          </a:fontRef>
-        </p:style>
-        <p:txBody>
-          <a:bodyPr lIns="0" tIns="0" rIns="0" bIns="0" rtlCol="0" anchor="ctr"/>
-          <a:lstStyle/>
-          <a:p>
-            <a:pPr algn="ctr"/>
-            <a:r>
-              <a:rPr lang="fr-FR" sz="500" b="1" dirty="0" smtClean="0">
-                <a:solidFill>
-                  <a:schemeClr val="tx1"/>
-                </a:solidFill>
-              </a:rPr>
-              <a:t>TID range 50</a:t>
-            </a:r>
-            <a:endParaRPr lang="fr-FR" sz="500" b="1" dirty="0">
-              <a:solidFill>
-                <a:srgbClr val="FF0000"/>
-              </a:solidFill>
-            </a:endParaRPr>
-          </a:p>
-        </p:txBody>
-      </p:sp>
-      <p:sp>
-        <p:nvSpPr>
-          <p:cNvPr id="109" name="Rectangle à coins arrondis 108"/>
-          <p:cNvSpPr/>
-          <p:nvPr/>
-        </p:nvSpPr>
-        <p:spPr>
-          <a:xfrm>
-            <a:off x="141698" y="2843505"/>
-            <a:ext cx="536550" cy="105767"/>
-          </a:xfrm>
-          <a:prstGeom prst="roundRect">
-            <a:avLst/>
-          </a:prstGeom>
-          <a:ln/>
-        </p:spPr>
-        <p:style>
-          <a:lnRef idx="2">
-            <a:schemeClr val="accent1"/>
-          </a:lnRef>
-          <a:fillRef idx="1">
-            <a:schemeClr val="lt1"/>
-          </a:fillRef>
-          <a:effectRef idx="0">
-            <a:schemeClr val="accent1"/>
-          </a:effectRef>
-          <a:fontRef idx="minor">
-            <a:schemeClr val="dk1"/>
-          </a:fontRef>
-        </p:style>
-        <p:txBody>
-          <a:bodyPr lIns="0" tIns="0" rIns="0" bIns="0" rtlCol="0" anchor="ctr"/>
-          <a:lstStyle/>
-          <a:p>
-            <a:pPr algn="ctr"/>
-            <a:r>
-              <a:rPr lang="fr-FR" sz="500" b="1" dirty="0" smtClean="0">
-                <a:solidFill>
-                  <a:schemeClr val="tx1"/>
-                </a:solidFill>
-              </a:rPr>
-              <a:t>TID range 25</a:t>
-            </a:r>
-            <a:endParaRPr lang="fr-FR" sz="500" b="1" dirty="0">
-              <a:solidFill>
-                <a:srgbClr val="FF0000"/>
-              </a:solidFill>
-            </a:endParaRPr>
-          </a:p>
-        </p:txBody>
-      </p:sp>
-      <p:pic>
-        <p:nvPicPr>
-          <p:cNvPr id="2" name="Image 1" descr="DCS: F-14 - Pre-Order / Gameplay Reveal Trailer - PRE ..."/>
-          <p:cNvPicPr>
-            <a:picLocks noChangeAspect="1"/>
-          </p:cNvPicPr>
-          <p:nvPr/>
-        </p:nvPicPr>
-        <p:blipFill>
-          <a:blip r:embed="rId2" cstate="print">
-            <a:extLst>
-              <a:ext uri="{28A0092B-C50C-407E-A947-70E740481C1C}">
-                <a14:useLocalDpi xmlns:a14="http://schemas.microsoft.com/office/drawing/2010/main" val="0"/>
-              </a:ext>
-            </a:extLst>
-          </a:blip>
-          <a:stretch>
-            <a:fillRect/>
-          </a:stretch>
-        </p:blipFill>
-        <p:spPr>
-          <a:xfrm>
-            <a:off x="6008228" y="5399949"/>
-            <a:ext cx="2142285" cy="1222232"/>
-          </a:xfrm>
-          <a:prstGeom prst="rect">
-            <a:avLst/>
-          </a:prstGeom>
-        </p:spPr>
-      </p:pic>
-      <p:sp>
-        <p:nvSpPr>
-          <p:cNvPr id="110" name="Rectangle à coins arrondis 109"/>
-          <p:cNvSpPr/>
-          <p:nvPr/>
-        </p:nvSpPr>
-        <p:spPr>
-          <a:xfrm>
-            <a:off x="3523095" y="93863"/>
-            <a:ext cx="1413006" cy="520231"/>
-          </a:xfrm>
-          <a:prstGeom prst="roundRect">
-            <a:avLst/>
-          </a:prstGeom>
-          <a:noFill/>
-          <a:ln w="9525" cap="flat" cmpd="sng" algn="ctr">
-            <a:solidFill>
-              <a:schemeClr val="accent5"/>
-            </a:solidFill>
-            <a:prstDash val="solid"/>
-            <a:round/>
-            <a:headEnd type="none" w="med" len="med"/>
-            <a:tailEnd type="none" w="med" len="med"/>
-          </a:ln>
-        </p:spPr>
-        <p:style>
-          <a:lnRef idx="0">
-            <a:scrgbClr r="0" g="0" b="0"/>
-          </a:lnRef>
-          <a:fillRef idx="0">
-            <a:scrgbClr r="0" g="0" b="0"/>
-          </a:fillRef>
-          <a:effectRef idx="0">
-            <a:scrgbClr r="0" g="0" b="0"/>
-          </a:effectRef>
-          <a:fontRef idx="minor">
-            <a:schemeClr val="accent5"/>
-          </a:fontRef>
-        </p:style>
-        <p:txBody>
-          <a:bodyPr lIns="0" tIns="0" rIns="0" bIns="0" rtlCol="0" anchor="ctr"/>
-          <a:lstStyle/>
-          <a:p>
-            <a:pPr algn="ctr"/>
-            <a:r>
-              <a:rPr lang="fr-FR" sz="1000" b="1" dirty="0" smtClean="0">
-                <a:ln w="0"/>
-                <a:solidFill>
-                  <a:schemeClr val="accent1"/>
-                </a:solidFill>
-                <a:effectLst>
-                  <a:outerShdw blurRad="38100" dist="25400" dir="5400000" algn="ctr" rotWithShape="0">
-                    <a:srgbClr val="6E747A">
-                      <a:alpha val="43000"/>
-                    </a:srgbClr>
-                  </a:outerShdw>
-                </a:effectLst>
-              </a:rPr>
-              <a:t>59th Gemini</a:t>
-            </a:r>
-          </a:p>
-          <a:p>
-            <a:pPr algn="ctr"/>
-            <a:r>
-              <a:rPr lang="fr-FR" sz="1000" b="1" dirty="0" smtClean="0">
-                <a:ln w="0"/>
-                <a:solidFill>
-                  <a:schemeClr val="accent1"/>
-                </a:solidFill>
-                <a:effectLst>
-                  <a:outerShdw blurRad="38100" dist="25400" dir="5400000" algn="ctr" rotWithShape="0">
-                    <a:srgbClr val="6E747A">
-                      <a:alpha val="43000"/>
-                    </a:srgbClr>
-                  </a:outerShdw>
-                </a:effectLst>
-              </a:rPr>
-              <a:t>DCS F14B – RIO </a:t>
-            </a:r>
-            <a:r>
-              <a:rPr lang="fr-FR" sz="1000" b="1" dirty="0" err="1" smtClean="0">
-                <a:ln w="0"/>
-                <a:solidFill>
-                  <a:schemeClr val="accent1"/>
-                </a:solidFill>
-                <a:effectLst>
-                  <a:outerShdw blurRad="38100" dist="25400" dir="5400000" algn="ctr" rotWithShape="0">
-                    <a:srgbClr val="6E747A">
-                      <a:alpha val="43000"/>
-                    </a:srgbClr>
-                  </a:outerShdw>
-                </a:effectLst>
-              </a:rPr>
-              <a:t>mappings</a:t>
-            </a:r>
-            <a:endParaRPr lang="fr-FR" sz="1000" b="1" dirty="0" smtClean="0">
-              <a:ln w="0"/>
-              <a:solidFill>
-                <a:schemeClr val="accent1"/>
-              </a:solidFill>
-              <a:effectLst>
-                <a:outerShdw blurRad="38100" dist="25400" dir="5400000" algn="ctr" rotWithShape="0">
-                  <a:srgbClr val="6E747A">
-                    <a:alpha val="43000"/>
-                  </a:srgbClr>
-                </a:outerShdw>
-              </a:effectLst>
-            </a:endParaRPr>
-          </a:p>
-          <a:p>
-            <a:pPr algn="ctr"/>
-            <a:r>
-              <a:rPr lang="fr-FR" sz="1000" b="1" smtClean="0">
-                <a:ln w="0"/>
-                <a:solidFill>
-                  <a:schemeClr val="accent1"/>
-                </a:solidFill>
-                <a:effectLst>
-                  <a:outerShdw blurRad="38100" dist="25400" dir="5400000" algn="ctr" rotWithShape="0">
-                    <a:srgbClr val="6E747A">
-                      <a:alpha val="43000"/>
-                    </a:srgbClr>
-                  </a:outerShdw>
-                </a:effectLst>
-              </a:rPr>
-              <a:t>Version </a:t>
-            </a:r>
-            <a:r>
-              <a:rPr lang="fr-FR" sz="1000" b="1" smtClean="0">
-                <a:ln w="0"/>
-                <a:solidFill>
-                  <a:schemeClr val="accent1"/>
-                </a:solidFill>
-                <a:effectLst>
-                  <a:outerShdw blurRad="38100" dist="25400" dir="5400000" algn="ctr" rotWithShape="0">
-                    <a:srgbClr val="6E747A">
-                      <a:alpha val="43000"/>
-                    </a:srgbClr>
-                  </a:outerShdw>
-                </a:effectLst>
-              </a:rPr>
-              <a:t>0.5.0</a:t>
-            </a:r>
-            <a:endParaRPr lang="fr-FR" sz="1000" b="1" dirty="0" smtClean="0">
-              <a:ln w="0"/>
-              <a:solidFill>
-                <a:schemeClr val="accent1"/>
-              </a:solidFill>
-              <a:effectLst>
-                <a:outerShdw blurRad="38100" dist="25400" dir="5400000" algn="ctr" rotWithShape="0">
-                  <a:srgbClr val="6E747A">
-                    <a:alpha val="43000"/>
-                  </a:srgbClr>
-                </a:outerShdw>
-              </a:effectLst>
             </a:endParaRPr>
           </a:p>
         </p:txBody>

</xml_diff>